<commit_message>
fix validation bug; export images for presentation
</commit_message>
<xml_diff>
--- a/presentation/presentation1.pptx
+++ b/presentation/presentation1.pptx
@@ -5,7 +5,7 @@
     <p:sldMasterId id="2147483648" r:id="rId1"/>
   </p:sldMasterIdLst>
   <p:notesMasterIdLst>
-    <p:notesMasterId r:id="rId13"/>
+    <p:notesMasterId r:id="rId19"/>
   </p:notesMasterIdLst>
   <p:sldIdLst>
     <p:sldId id="256" r:id="rId2"/>
@@ -17,8 +17,14 @@
     <p:sldId id="264" r:id="rId8"/>
     <p:sldId id="262" r:id="rId9"/>
     <p:sldId id="263" r:id="rId10"/>
-    <p:sldId id="265" r:id="rId11"/>
-    <p:sldId id="266" r:id="rId12"/>
+    <p:sldId id="272" r:id="rId11"/>
+    <p:sldId id="265" r:id="rId12"/>
+    <p:sldId id="267" r:id="rId13"/>
+    <p:sldId id="268" r:id="rId14"/>
+    <p:sldId id="269" r:id="rId15"/>
+    <p:sldId id="270" r:id="rId16"/>
+    <p:sldId id="271" r:id="rId17"/>
+    <p:sldId id="266" r:id="rId18"/>
   </p:sldIdLst>
   <p:sldSz cx="12192000" cy="6858000"/>
   <p:notesSz cx="6858000" cy="9144000"/>
@@ -207,7 +213,7 @@
           <a:p>
             <a:fld id="{FA8F02CA-77CB-4E54-B712-21E588799EE8}" type="datetimeFigureOut">
               <a:rPr lang="de-DE" smtClean="0"/>
-              <a:t>06.03.20</a:t>
+              <a:t>07.03.20</a:t>
             </a:fld>
             <a:endParaRPr lang="de-DE"/>
           </a:p>
@@ -4633,108 +4639,604 @@
           <a:lstStyle/>
           <a:p>
             <a:r>
-              <a:rPr lang="en-US" noProof="0" dirty="0"/>
-              <a:t>Demo</a:t>
-            </a:r>
-          </a:p>
-        </p:txBody>
-      </p:sp>
-      <p:sp>
-        <p:nvSpPr>
-          <p:cNvPr id="3" name="Inhaltsplatzhalter 2">
-            <a:extLst>
-              <a:ext uri="{FF2B5EF4-FFF2-40B4-BE49-F238E27FC236}">
-                <a16:creationId xmlns:a16="http://schemas.microsoft.com/office/drawing/2014/main" id="{900E3307-8428-4C7A-A1DA-C96FE547A036}"/>
-              </a:ext>
-            </a:extLst>
-          </p:cNvPr>
-          <p:cNvSpPr>
-            <a:spLocks noGrp="1"/>
-          </p:cNvSpPr>
-          <p:nvPr>
-            <p:ph idx="1"/>
-          </p:nvPr>
+              <a:rPr lang="en-US" noProof="0" dirty="0" err="1"/>
+              <a:t>Validierung</a:t>
+            </a:r>
+            <a:endParaRPr lang="en-US" noProof="0" dirty="0"/>
+          </a:p>
+        </p:txBody>
+      </p:sp>
+      <p:sp>
+        <p:nvSpPr>
+          <p:cNvPr id="4" name="Datumsplatzhalter 3">
+            <a:extLst>
+              <a:ext uri="{FF2B5EF4-FFF2-40B4-BE49-F238E27FC236}">
+                <a16:creationId xmlns:a16="http://schemas.microsoft.com/office/drawing/2014/main" id="{9CCAFD67-B02A-4CC5-A0AF-41ECCAE2B82F}"/>
+              </a:ext>
+            </a:extLst>
+          </p:cNvPr>
+          <p:cNvSpPr>
+            <a:spLocks noGrp="1"/>
+          </p:cNvSpPr>
+          <p:nvPr>
+            <p:ph type="dt" sz="half" idx="10"/>
+          </p:nvPr>
+        </p:nvSpPr>
+        <p:spPr/>
+        <p:txBody>
+          <a:bodyPr/>
+          <a:lstStyle/>
+          <a:p>
+            <a:r>
+              <a:rPr lang="de-DE"/>
+              <a:t>25.03.2020</a:t>
+            </a:r>
+          </a:p>
+        </p:txBody>
+      </p:sp>
+      <p:sp>
+        <p:nvSpPr>
+          <p:cNvPr id="6" name="Foliennummernplatzhalter 5">
+            <a:extLst>
+              <a:ext uri="{FF2B5EF4-FFF2-40B4-BE49-F238E27FC236}">
+                <a16:creationId xmlns:a16="http://schemas.microsoft.com/office/drawing/2014/main" id="{2014E5A3-BB19-4CC6-A059-F359A2A51340}"/>
+              </a:ext>
+            </a:extLst>
+          </p:cNvPr>
+          <p:cNvSpPr>
+            <a:spLocks noGrp="1"/>
+          </p:cNvSpPr>
+          <p:nvPr>
+            <p:ph type="sldNum" sz="quarter" idx="12"/>
+          </p:nvPr>
+        </p:nvSpPr>
+        <p:spPr/>
+        <p:txBody>
+          <a:bodyPr/>
+          <a:lstStyle/>
+          <a:p>
+            <a:fld id="{61696EC4-B4CF-4701-AD06-A8439D6D8E12}" type="slidenum">
+              <a:rPr lang="de-DE" smtClean="0"/>
+              <a:t>10</a:t>
+            </a:fld>
+            <a:endParaRPr lang="de-DE"/>
+          </a:p>
+        </p:txBody>
+      </p:sp>
+      <p:sp>
+        <p:nvSpPr>
+          <p:cNvPr id="7" name="Inhaltsplatzhalter 2">
+            <a:extLst>
+              <a:ext uri="{FF2B5EF4-FFF2-40B4-BE49-F238E27FC236}">
+                <a16:creationId xmlns:a16="http://schemas.microsoft.com/office/drawing/2014/main" id="{8AAF696D-35E6-C94A-816B-16AC4067B035}"/>
+              </a:ext>
+            </a:extLst>
+          </p:cNvPr>
+          <p:cNvSpPr txBox="1">
+            <a:spLocks/>
+          </p:cNvSpPr>
+          <p:nvPr/>
         </p:nvSpPr>
         <p:spPr>
           <a:xfrm>
-            <a:off x="524664" y="1269207"/>
-            <a:ext cx="11142672" cy="4502318"/>
+            <a:off x="279993" y="4338424"/>
+            <a:ext cx="3531477" cy="1407920"/>
           </a:xfrm>
+          <a:prstGeom prst="rect">
+            <a:avLst/>
+          </a:prstGeom>
         </p:spPr>
         <p:txBody>
-          <a:bodyPr/>
-          <a:lstStyle/>
+          <a:bodyPr vert="horz" lIns="0" tIns="0" rIns="0" bIns="0" rtlCol="0">
+            <a:normAutofit/>
+          </a:bodyPr>
+          <a:lstStyle>
+            <a:lvl1pPr marL="361950" indent="-361950" algn="l" defTabSz="914400" rtl="0" eaLnBrk="1" latinLnBrk="0" hangingPunct="1">
+              <a:lnSpc>
+                <a:spcPct val="90000"/>
+              </a:lnSpc>
+              <a:spcBef>
+                <a:spcPts val="600"/>
+              </a:spcBef>
+              <a:buSzPct val="88000"/>
+              <a:buFontTx/>
+              <a:buBlip>
+                <a:blip r:embed="rId2"/>
+              </a:buBlip>
+              <a:defRPr sz="2800" kern="1200">
+                <a:solidFill>
+                  <a:schemeClr val="tx1"/>
+                </a:solidFill>
+                <a:latin typeface="+mn-lt"/>
+                <a:ea typeface="+mn-ea"/>
+                <a:cs typeface="+mn-cs"/>
+              </a:defRPr>
+            </a:lvl1pPr>
+            <a:lvl2pPr marL="809625" indent="-361950" algn="l" defTabSz="914400" rtl="0" eaLnBrk="1" latinLnBrk="0" hangingPunct="1">
+              <a:lnSpc>
+                <a:spcPct val="90000"/>
+              </a:lnSpc>
+              <a:spcBef>
+                <a:spcPts val="600"/>
+              </a:spcBef>
+              <a:buSzPct val="88000"/>
+              <a:buFontTx/>
+              <a:buBlip>
+                <a:blip r:embed="rId2"/>
+              </a:buBlip>
+              <a:defRPr sz="2400" kern="1200">
+                <a:solidFill>
+                  <a:schemeClr val="tx1"/>
+                </a:solidFill>
+                <a:latin typeface="+mn-lt"/>
+                <a:ea typeface="+mn-ea"/>
+                <a:cs typeface="+mn-cs"/>
+              </a:defRPr>
+            </a:lvl2pPr>
+            <a:lvl3pPr marL="1257300" indent="-361950" algn="l" defTabSz="914400" rtl="0" eaLnBrk="1" latinLnBrk="0" hangingPunct="1">
+              <a:lnSpc>
+                <a:spcPct val="90000"/>
+              </a:lnSpc>
+              <a:spcBef>
+                <a:spcPts val="600"/>
+              </a:spcBef>
+              <a:buSzPct val="88000"/>
+              <a:buFontTx/>
+              <a:buBlip>
+                <a:blip r:embed="rId2"/>
+              </a:buBlip>
+              <a:defRPr sz="2000" kern="1200">
+                <a:solidFill>
+                  <a:schemeClr val="tx1"/>
+                </a:solidFill>
+                <a:latin typeface="+mn-lt"/>
+                <a:ea typeface="+mn-ea"/>
+                <a:cs typeface="+mn-cs"/>
+              </a:defRPr>
+            </a:lvl3pPr>
+            <a:lvl4pPr marL="1704975" indent="-361950" algn="l" defTabSz="914400" rtl="0" eaLnBrk="1" latinLnBrk="0" hangingPunct="1">
+              <a:lnSpc>
+                <a:spcPct val="90000"/>
+              </a:lnSpc>
+              <a:spcBef>
+                <a:spcPts val="600"/>
+              </a:spcBef>
+              <a:buSzPct val="88000"/>
+              <a:buFontTx/>
+              <a:buBlip>
+                <a:blip r:embed="rId2"/>
+              </a:buBlip>
+              <a:defRPr sz="2000" kern="1200">
+                <a:solidFill>
+                  <a:schemeClr val="tx1"/>
+                </a:solidFill>
+                <a:latin typeface="+mn-lt"/>
+                <a:ea typeface="+mn-ea"/>
+                <a:cs typeface="+mn-cs"/>
+              </a:defRPr>
+            </a:lvl4pPr>
+            <a:lvl5pPr marL="2152650" indent="-361950" algn="l" defTabSz="914400" rtl="0" eaLnBrk="1" latinLnBrk="0" hangingPunct="1">
+              <a:lnSpc>
+                <a:spcPct val="90000"/>
+              </a:lnSpc>
+              <a:spcBef>
+                <a:spcPts val="600"/>
+              </a:spcBef>
+              <a:buSzPct val="88000"/>
+              <a:buFontTx/>
+              <a:buBlip>
+                <a:blip r:embed="rId2"/>
+              </a:buBlip>
+              <a:defRPr sz="2000" kern="1200">
+                <a:solidFill>
+                  <a:schemeClr val="tx1"/>
+                </a:solidFill>
+                <a:latin typeface="+mn-lt"/>
+                <a:ea typeface="+mn-ea"/>
+                <a:cs typeface="+mn-cs"/>
+              </a:defRPr>
+            </a:lvl5pPr>
+            <a:lvl6pPr marL="2514600" indent="-228600" algn="l" defTabSz="914400" rtl="0" eaLnBrk="1" latinLnBrk="0" hangingPunct="1">
+              <a:lnSpc>
+                <a:spcPct val="90000"/>
+              </a:lnSpc>
+              <a:spcBef>
+                <a:spcPts val="500"/>
+              </a:spcBef>
+              <a:buFont typeface="Arial" panose="020B0604020202020204" pitchFamily="34" charset="0"/>
+              <a:buChar char="•"/>
+              <a:defRPr sz="1800" kern="1200">
+                <a:solidFill>
+                  <a:schemeClr val="tx1"/>
+                </a:solidFill>
+                <a:latin typeface="+mn-lt"/>
+                <a:ea typeface="+mn-ea"/>
+                <a:cs typeface="+mn-cs"/>
+              </a:defRPr>
+            </a:lvl6pPr>
+            <a:lvl7pPr marL="2971800" indent="-228600" algn="l" defTabSz="914400" rtl="0" eaLnBrk="1" latinLnBrk="0" hangingPunct="1">
+              <a:lnSpc>
+                <a:spcPct val="90000"/>
+              </a:lnSpc>
+              <a:spcBef>
+                <a:spcPts val="500"/>
+              </a:spcBef>
+              <a:buFont typeface="Arial" panose="020B0604020202020204" pitchFamily="34" charset="0"/>
+              <a:buChar char="•"/>
+              <a:defRPr sz="1800" kern="1200">
+                <a:solidFill>
+                  <a:schemeClr val="tx1"/>
+                </a:solidFill>
+                <a:latin typeface="+mn-lt"/>
+                <a:ea typeface="+mn-ea"/>
+                <a:cs typeface="+mn-cs"/>
+              </a:defRPr>
+            </a:lvl7pPr>
+            <a:lvl8pPr marL="3429000" indent="-228600" algn="l" defTabSz="914400" rtl="0" eaLnBrk="1" latinLnBrk="0" hangingPunct="1">
+              <a:lnSpc>
+                <a:spcPct val="90000"/>
+              </a:lnSpc>
+              <a:spcBef>
+                <a:spcPts val="500"/>
+              </a:spcBef>
+              <a:buFont typeface="Arial" panose="020B0604020202020204" pitchFamily="34" charset="0"/>
+              <a:buChar char="•"/>
+              <a:defRPr sz="1800" kern="1200">
+                <a:solidFill>
+                  <a:schemeClr val="tx1"/>
+                </a:solidFill>
+                <a:latin typeface="+mn-lt"/>
+                <a:ea typeface="+mn-ea"/>
+                <a:cs typeface="+mn-cs"/>
+              </a:defRPr>
+            </a:lvl8pPr>
+            <a:lvl9pPr marL="3886200" indent="-228600" algn="l" defTabSz="914400" rtl="0" eaLnBrk="1" latinLnBrk="0" hangingPunct="1">
+              <a:lnSpc>
+                <a:spcPct val="90000"/>
+              </a:lnSpc>
+              <a:spcBef>
+                <a:spcPts val="500"/>
+              </a:spcBef>
+              <a:buFont typeface="Arial" panose="020B0604020202020204" pitchFamily="34" charset="0"/>
+              <a:buChar char="•"/>
+              <a:defRPr sz="1800" kern="1200">
+                <a:solidFill>
+                  <a:schemeClr val="tx1"/>
+                </a:solidFill>
+                <a:latin typeface="+mn-lt"/>
+                <a:ea typeface="+mn-ea"/>
+                <a:cs typeface="+mn-cs"/>
+              </a:defRPr>
+            </a:lvl9pPr>
+          </a:lstStyle>
           <a:p>
             <a:pPr>
               <a:lnSpc>
                 <a:spcPct val="100000"/>
               </a:lnSpc>
             </a:pPr>
+            <a:r>
+              <a:rPr lang="de-DE" sz="2000" dirty="0"/>
+              <a:t>A.1 , A.2 , B ist erlaubt</a:t>
+            </a:r>
+          </a:p>
+          <a:p>
+            <a:pPr lvl="1">
+              <a:lnSpc>
+                <a:spcPct val="100000"/>
+              </a:lnSpc>
+            </a:pPr>
+            <a:r>
+              <a:rPr lang="de-DE" sz="1800" dirty="0"/>
+              <a:t>A.1, B nicht</a:t>
+            </a:r>
+          </a:p>
+          <a:p>
+            <a:pPr lvl="1">
+              <a:lnSpc>
+                <a:spcPct val="100000"/>
+              </a:lnSpc>
+            </a:pPr>
+            <a:r>
+              <a:rPr lang="de-DE" sz="1800" dirty="0"/>
+              <a:t>A.1, A.2, B.1 auch nicht</a:t>
+            </a:r>
+          </a:p>
+          <a:p>
+            <a:pPr>
+              <a:lnSpc>
+                <a:spcPct val="100000"/>
+              </a:lnSpc>
+            </a:pPr>
+            <a:r>
+              <a:rPr lang="de-DE" sz="2000" dirty="0"/>
+              <a:t>Knoten ist Multi-Menge</a:t>
+            </a:r>
+          </a:p>
+          <a:p>
+            <a:pPr lvl="1">
+              <a:lnSpc>
+                <a:spcPct val="100000"/>
+              </a:lnSpc>
+            </a:pPr>
             <a:endParaRPr lang="de-DE" dirty="0"/>
           </a:p>
         </p:txBody>
       </p:sp>
       <p:sp>
         <p:nvSpPr>
-          <p:cNvPr id="4" name="Datumsplatzhalter 3">
-            <a:extLst>
-              <a:ext uri="{FF2B5EF4-FFF2-40B4-BE49-F238E27FC236}">
-                <a16:creationId xmlns:a16="http://schemas.microsoft.com/office/drawing/2014/main" id="{9CCAFD67-B02A-4CC5-A0AF-41ECCAE2B82F}"/>
-              </a:ext>
-            </a:extLst>
-          </p:cNvPr>
-          <p:cNvSpPr>
-            <a:spLocks noGrp="1"/>
-          </p:cNvSpPr>
-          <p:nvPr>
-            <p:ph type="dt" sz="half" idx="10"/>
-          </p:nvPr>
-        </p:nvSpPr>
-        <p:spPr/>
-        <p:txBody>
-          <a:bodyPr/>
-          <a:lstStyle/>
-          <a:p>
-            <a:r>
-              <a:rPr lang="de-DE"/>
-              <a:t>25.03.2020</a:t>
-            </a:r>
-          </a:p>
-        </p:txBody>
-      </p:sp>
-      <p:sp>
-        <p:nvSpPr>
-          <p:cNvPr id="6" name="Foliennummernplatzhalter 5">
-            <a:extLst>
-              <a:ext uri="{FF2B5EF4-FFF2-40B4-BE49-F238E27FC236}">
-                <a16:creationId xmlns:a16="http://schemas.microsoft.com/office/drawing/2014/main" id="{2014E5A3-BB19-4CC6-A059-F359A2A51340}"/>
-              </a:ext>
-            </a:extLst>
-          </p:cNvPr>
-          <p:cNvSpPr>
-            <a:spLocks noGrp="1"/>
-          </p:cNvSpPr>
-          <p:nvPr>
-            <p:ph type="sldNum" sz="quarter" idx="12"/>
-          </p:nvPr>
-        </p:nvSpPr>
-        <p:spPr/>
-        <p:txBody>
-          <a:bodyPr/>
-          <a:lstStyle/>
-          <a:p>
-            <a:fld id="{61696EC4-B4CF-4701-AD06-A8439D6D8E12}" type="slidenum">
-              <a:rPr lang="de-DE" smtClean="0"/>
-              <a:t>10</a:t>
-            </a:fld>
-            <a:endParaRPr lang="de-DE"/>
-          </a:p>
-        </p:txBody>
-      </p:sp>
+          <p:cNvPr id="11" name="Inhaltsplatzhalter 2">
+            <a:extLst>
+              <a:ext uri="{FF2B5EF4-FFF2-40B4-BE49-F238E27FC236}">
+                <a16:creationId xmlns:a16="http://schemas.microsoft.com/office/drawing/2014/main" id="{5369B94C-4C74-434B-8917-6AB66EF8A3B5}"/>
+              </a:ext>
+            </a:extLst>
+          </p:cNvPr>
+          <p:cNvSpPr txBox="1">
+            <a:spLocks/>
+          </p:cNvSpPr>
+          <p:nvPr/>
+        </p:nvSpPr>
+        <p:spPr>
+          <a:xfrm>
+            <a:off x="3942174" y="4332318"/>
+            <a:ext cx="3531477" cy="1407920"/>
+          </a:xfrm>
+          <a:prstGeom prst="rect">
+            <a:avLst/>
+          </a:prstGeom>
+        </p:spPr>
+        <p:txBody>
+          <a:bodyPr vert="horz" lIns="0" tIns="0" rIns="0" bIns="0" rtlCol="0">
+            <a:normAutofit/>
+          </a:bodyPr>
+          <a:lstStyle>
+            <a:lvl1pPr marL="361950" indent="-361950" algn="l" defTabSz="914400" rtl="0" eaLnBrk="1" latinLnBrk="0" hangingPunct="1">
+              <a:lnSpc>
+                <a:spcPct val="90000"/>
+              </a:lnSpc>
+              <a:spcBef>
+                <a:spcPts val="600"/>
+              </a:spcBef>
+              <a:buSzPct val="88000"/>
+              <a:buFontTx/>
+              <a:buBlip>
+                <a:blip r:embed="rId2"/>
+              </a:buBlip>
+              <a:defRPr sz="2800" kern="1200">
+                <a:solidFill>
+                  <a:schemeClr val="tx1"/>
+                </a:solidFill>
+                <a:latin typeface="+mn-lt"/>
+                <a:ea typeface="+mn-ea"/>
+                <a:cs typeface="+mn-cs"/>
+              </a:defRPr>
+            </a:lvl1pPr>
+            <a:lvl2pPr marL="809625" indent="-361950" algn="l" defTabSz="914400" rtl="0" eaLnBrk="1" latinLnBrk="0" hangingPunct="1">
+              <a:lnSpc>
+                <a:spcPct val="90000"/>
+              </a:lnSpc>
+              <a:spcBef>
+                <a:spcPts val="600"/>
+              </a:spcBef>
+              <a:buSzPct val="88000"/>
+              <a:buFontTx/>
+              <a:buBlip>
+                <a:blip r:embed="rId2"/>
+              </a:buBlip>
+              <a:defRPr sz="2400" kern="1200">
+                <a:solidFill>
+                  <a:schemeClr val="tx1"/>
+                </a:solidFill>
+                <a:latin typeface="+mn-lt"/>
+                <a:ea typeface="+mn-ea"/>
+                <a:cs typeface="+mn-cs"/>
+              </a:defRPr>
+            </a:lvl2pPr>
+            <a:lvl3pPr marL="1257300" indent="-361950" algn="l" defTabSz="914400" rtl="0" eaLnBrk="1" latinLnBrk="0" hangingPunct="1">
+              <a:lnSpc>
+                <a:spcPct val="90000"/>
+              </a:lnSpc>
+              <a:spcBef>
+                <a:spcPts val="600"/>
+              </a:spcBef>
+              <a:buSzPct val="88000"/>
+              <a:buFontTx/>
+              <a:buBlip>
+                <a:blip r:embed="rId2"/>
+              </a:buBlip>
+              <a:defRPr sz="2000" kern="1200">
+                <a:solidFill>
+                  <a:schemeClr val="tx1"/>
+                </a:solidFill>
+                <a:latin typeface="+mn-lt"/>
+                <a:ea typeface="+mn-ea"/>
+                <a:cs typeface="+mn-cs"/>
+              </a:defRPr>
+            </a:lvl3pPr>
+            <a:lvl4pPr marL="1704975" indent="-361950" algn="l" defTabSz="914400" rtl="0" eaLnBrk="1" latinLnBrk="0" hangingPunct="1">
+              <a:lnSpc>
+                <a:spcPct val="90000"/>
+              </a:lnSpc>
+              <a:spcBef>
+                <a:spcPts val="600"/>
+              </a:spcBef>
+              <a:buSzPct val="88000"/>
+              <a:buFontTx/>
+              <a:buBlip>
+                <a:blip r:embed="rId2"/>
+              </a:buBlip>
+              <a:defRPr sz="2000" kern="1200">
+                <a:solidFill>
+                  <a:schemeClr val="tx1"/>
+                </a:solidFill>
+                <a:latin typeface="+mn-lt"/>
+                <a:ea typeface="+mn-ea"/>
+                <a:cs typeface="+mn-cs"/>
+              </a:defRPr>
+            </a:lvl4pPr>
+            <a:lvl5pPr marL="2152650" indent="-361950" algn="l" defTabSz="914400" rtl="0" eaLnBrk="1" latinLnBrk="0" hangingPunct="1">
+              <a:lnSpc>
+                <a:spcPct val="90000"/>
+              </a:lnSpc>
+              <a:spcBef>
+                <a:spcPts val="600"/>
+              </a:spcBef>
+              <a:buSzPct val="88000"/>
+              <a:buFontTx/>
+              <a:buBlip>
+                <a:blip r:embed="rId2"/>
+              </a:buBlip>
+              <a:defRPr sz="2000" kern="1200">
+                <a:solidFill>
+                  <a:schemeClr val="tx1"/>
+                </a:solidFill>
+                <a:latin typeface="+mn-lt"/>
+                <a:ea typeface="+mn-ea"/>
+                <a:cs typeface="+mn-cs"/>
+              </a:defRPr>
+            </a:lvl5pPr>
+            <a:lvl6pPr marL="2514600" indent="-228600" algn="l" defTabSz="914400" rtl="0" eaLnBrk="1" latinLnBrk="0" hangingPunct="1">
+              <a:lnSpc>
+                <a:spcPct val="90000"/>
+              </a:lnSpc>
+              <a:spcBef>
+                <a:spcPts val="500"/>
+              </a:spcBef>
+              <a:buFont typeface="Arial" panose="020B0604020202020204" pitchFamily="34" charset="0"/>
+              <a:buChar char="•"/>
+              <a:defRPr sz="1800" kern="1200">
+                <a:solidFill>
+                  <a:schemeClr val="tx1"/>
+                </a:solidFill>
+                <a:latin typeface="+mn-lt"/>
+                <a:ea typeface="+mn-ea"/>
+                <a:cs typeface="+mn-cs"/>
+              </a:defRPr>
+            </a:lvl6pPr>
+            <a:lvl7pPr marL="2971800" indent="-228600" algn="l" defTabSz="914400" rtl="0" eaLnBrk="1" latinLnBrk="0" hangingPunct="1">
+              <a:lnSpc>
+                <a:spcPct val="90000"/>
+              </a:lnSpc>
+              <a:spcBef>
+                <a:spcPts val="500"/>
+              </a:spcBef>
+              <a:buFont typeface="Arial" panose="020B0604020202020204" pitchFamily="34" charset="0"/>
+              <a:buChar char="•"/>
+              <a:defRPr sz="1800" kern="1200">
+                <a:solidFill>
+                  <a:schemeClr val="tx1"/>
+                </a:solidFill>
+                <a:latin typeface="+mn-lt"/>
+                <a:ea typeface="+mn-ea"/>
+                <a:cs typeface="+mn-cs"/>
+              </a:defRPr>
+            </a:lvl7pPr>
+            <a:lvl8pPr marL="3429000" indent="-228600" algn="l" defTabSz="914400" rtl="0" eaLnBrk="1" latinLnBrk="0" hangingPunct="1">
+              <a:lnSpc>
+                <a:spcPct val="90000"/>
+              </a:lnSpc>
+              <a:spcBef>
+                <a:spcPts val="500"/>
+              </a:spcBef>
+              <a:buFont typeface="Arial" panose="020B0604020202020204" pitchFamily="34" charset="0"/>
+              <a:buChar char="•"/>
+              <a:defRPr sz="1800" kern="1200">
+                <a:solidFill>
+                  <a:schemeClr val="tx1"/>
+                </a:solidFill>
+                <a:latin typeface="+mn-lt"/>
+                <a:ea typeface="+mn-ea"/>
+                <a:cs typeface="+mn-cs"/>
+              </a:defRPr>
+            </a:lvl8pPr>
+            <a:lvl9pPr marL="3886200" indent="-228600" algn="l" defTabSz="914400" rtl="0" eaLnBrk="1" latinLnBrk="0" hangingPunct="1">
+              <a:lnSpc>
+                <a:spcPct val="90000"/>
+              </a:lnSpc>
+              <a:spcBef>
+                <a:spcPts val="500"/>
+              </a:spcBef>
+              <a:buFont typeface="Arial" panose="020B0604020202020204" pitchFamily="34" charset="0"/>
+              <a:buChar char="•"/>
+              <a:defRPr sz="1800" kern="1200">
+                <a:solidFill>
+                  <a:schemeClr val="tx1"/>
+                </a:solidFill>
+                <a:latin typeface="+mn-lt"/>
+                <a:ea typeface="+mn-ea"/>
+                <a:cs typeface="+mn-cs"/>
+              </a:defRPr>
+            </a:lvl9pPr>
+          </a:lstStyle>
+          <a:p>
+            <a:pPr>
+              <a:lnSpc>
+                <a:spcPct val="100000"/>
+              </a:lnSpc>
+            </a:pPr>
+            <a:r>
+              <a:rPr lang="de-DE" sz="2000" dirty="0"/>
+              <a:t>„Ausnahmen“ generieren alle Kandidaten</a:t>
+            </a:r>
+          </a:p>
+          <a:p>
+            <a:pPr>
+              <a:lnSpc>
+                <a:spcPct val="100000"/>
+              </a:lnSpc>
+            </a:pPr>
+            <a:r>
+              <a:rPr lang="de-DE" sz="2000" dirty="0" err="1"/>
+              <a:t>Pruning</a:t>
+            </a:r>
+            <a:r>
+              <a:rPr lang="de-DE" sz="2000" dirty="0"/>
+              <a:t> von Duplikaten</a:t>
+            </a:r>
+          </a:p>
+        </p:txBody>
+      </p:sp>
+      <p:pic>
+        <p:nvPicPr>
+          <p:cNvPr id="13" name="Grafik 12" descr="Ein Bild, das Fern, Monitor, Bedienung, sitzend enthält.&#10;&#10;Automatisch generierte Beschreibung">
+            <a:extLst>
+              <a:ext uri="{FF2B5EF4-FFF2-40B4-BE49-F238E27FC236}">
+                <a16:creationId xmlns:a16="http://schemas.microsoft.com/office/drawing/2014/main" id="{510F87E8-F869-694B-9557-B300585FF8DF}"/>
+              </a:ext>
+            </a:extLst>
+          </p:cNvPr>
+          <p:cNvPicPr>
+            <a:picLocks noChangeAspect="1"/>
+          </p:cNvPicPr>
+          <p:nvPr/>
+        </p:nvPicPr>
+        <p:blipFill>
+          <a:blip r:embed="rId3">
+            <a:extLst>
+              <a:ext uri="{28A0092B-C50C-407E-A947-70E740481C1C}">
+                <a14:useLocalDpi xmlns:a14="http://schemas.microsoft.com/office/drawing/2010/main" val="0"/>
+              </a:ext>
+            </a:extLst>
+          </a:blip>
+          <a:stretch>
+            <a:fillRect/>
+          </a:stretch>
+        </p:blipFill>
+        <p:spPr>
+          <a:xfrm>
+            <a:off x="176165" y="202268"/>
+            <a:ext cx="11839669" cy="3844215"/>
+          </a:xfrm>
+          <a:prstGeom prst="rect">
+            <a:avLst/>
+          </a:prstGeom>
+        </p:spPr>
+      </p:pic>
     </p:spTree>
     <p:extLst>
       <p:ext uri="{BB962C8B-B14F-4D97-AF65-F5344CB8AC3E}">
-        <p14:creationId xmlns:p14="http://schemas.microsoft.com/office/powerpoint/2010/main" val="1866389151"/>
+        <p14:creationId xmlns:p14="http://schemas.microsoft.com/office/powerpoint/2010/main" val="2101614505"/>
       </p:ext>
     </p:extLst>
   </p:cSld>
@@ -4788,10 +5290,9 @@
           <a:lstStyle/>
           <a:p>
             <a:r>
-              <a:rPr lang="en-US" noProof="0" dirty="0" err="1"/>
-              <a:t>Zusammenfassung</a:t>
-            </a:r>
-            <a:endParaRPr lang="en-US" noProof="0" dirty="0"/>
+              <a:rPr lang="en-US" noProof="0" dirty="0"/>
+              <a:t>Demo</a:t>
+            </a:r>
           </a:p>
         </p:txBody>
       </p:sp>
@@ -4882,6 +5383,937 @@
             <a:fld id="{61696EC4-B4CF-4701-AD06-A8439D6D8E12}" type="slidenum">
               <a:rPr lang="de-DE" smtClean="0"/>
               <a:t>11</a:t>
+            </a:fld>
+            <a:endParaRPr lang="de-DE"/>
+          </a:p>
+        </p:txBody>
+      </p:sp>
+    </p:spTree>
+    <p:extLst>
+      <p:ext uri="{BB962C8B-B14F-4D97-AF65-F5344CB8AC3E}">
+        <p14:creationId xmlns:p14="http://schemas.microsoft.com/office/powerpoint/2010/main" val="1866389151"/>
+      </p:ext>
+    </p:extLst>
+  </p:cSld>
+  <p:clrMapOvr>
+    <a:masterClrMapping/>
+  </p:clrMapOvr>
+</p:sld>
+</file>
+
+<file path=ppt/slides/slide12.xml><?xml version="1.0" encoding="utf-8"?>
+<p:sld xmlns:a="http://schemas.openxmlformats.org/drawingml/2006/main" xmlns:r="http://schemas.openxmlformats.org/officeDocument/2006/relationships" xmlns:p="http://schemas.openxmlformats.org/presentationml/2006/main">
+  <p:cSld>
+    <p:spTree>
+      <p:nvGrpSpPr>
+        <p:cNvPr id="1" name=""/>
+        <p:cNvGrpSpPr/>
+        <p:nvPr/>
+      </p:nvGrpSpPr>
+      <p:grpSpPr>
+        <a:xfrm>
+          <a:off x="0" y="0"/>
+          <a:ext cx="0" cy="0"/>
+          <a:chOff x="0" y="0"/>
+          <a:chExt cx="0" cy="0"/>
+        </a:xfrm>
+      </p:grpSpPr>
+      <p:sp>
+        <p:nvSpPr>
+          <p:cNvPr id="2" name="Titel 1">
+            <a:extLst>
+              <a:ext uri="{FF2B5EF4-FFF2-40B4-BE49-F238E27FC236}">
+                <a16:creationId xmlns:a16="http://schemas.microsoft.com/office/drawing/2014/main" id="{4E4AE26E-BDAE-4262-A057-39AC2366A5F1}"/>
+              </a:ext>
+            </a:extLst>
+          </p:cNvPr>
+          <p:cNvSpPr>
+            <a:spLocks noGrp="1"/>
+          </p:cNvSpPr>
+          <p:nvPr>
+            <p:ph type="title"/>
+          </p:nvPr>
+        </p:nvSpPr>
+        <p:spPr>
+          <a:xfrm>
+            <a:off x="524664" y="444005"/>
+            <a:ext cx="9178008" cy="627829"/>
+          </a:xfrm>
+        </p:spPr>
+        <p:txBody>
+          <a:bodyPr/>
+          <a:lstStyle/>
+          <a:p>
+            <a:r>
+              <a:rPr lang="en-US" noProof="0" dirty="0"/>
+              <a:t>Meta-Modell (1)</a:t>
+            </a:r>
+          </a:p>
+        </p:txBody>
+      </p:sp>
+      <p:pic>
+        <p:nvPicPr>
+          <p:cNvPr id="7" name="Inhaltsplatzhalter 6">
+            <a:extLst>
+              <a:ext uri="{FF2B5EF4-FFF2-40B4-BE49-F238E27FC236}">
+                <a16:creationId xmlns:a16="http://schemas.microsoft.com/office/drawing/2014/main" id="{AAFBDB75-4142-7142-926F-5BA01FB0FEA5}"/>
+              </a:ext>
+            </a:extLst>
+          </p:cNvPr>
+          <p:cNvPicPr>
+            <a:picLocks noGrp="1" noChangeAspect="1"/>
+          </p:cNvPicPr>
+          <p:nvPr>
+            <p:ph idx="1"/>
+          </p:nvPr>
+        </p:nvPicPr>
+        <p:blipFill>
+          <a:blip r:embed="rId2">
+            <a:extLst>
+              <a:ext uri="{28A0092B-C50C-407E-A947-70E740481C1C}">
+                <a14:useLocalDpi xmlns:a14="http://schemas.microsoft.com/office/drawing/2010/main" val="0"/>
+              </a:ext>
+            </a:extLst>
+          </a:blip>
+          <a:stretch>
+            <a:fillRect/>
+          </a:stretch>
+        </p:blipFill>
+        <p:spPr>
+          <a:xfrm>
+            <a:off x="2899213" y="1261021"/>
+            <a:ext cx="5330387" cy="1819354"/>
+          </a:xfrm>
+        </p:spPr>
+      </p:pic>
+      <p:sp>
+        <p:nvSpPr>
+          <p:cNvPr id="4" name="Datumsplatzhalter 3">
+            <a:extLst>
+              <a:ext uri="{FF2B5EF4-FFF2-40B4-BE49-F238E27FC236}">
+                <a16:creationId xmlns:a16="http://schemas.microsoft.com/office/drawing/2014/main" id="{9CCAFD67-B02A-4CC5-A0AF-41ECCAE2B82F}"/>
+              </a:ext>
+            </a:extLst>
+          </p:cNvPr>
+          <p:cNvSpPr>
+            <a:spLocks noGrp="1"/>
+          </p:cNvSpPr>
+          <p:nvPr>
+            <p:ph type="dt" sz="half" idx="10"/>
+          </p:nvPr>
+        </p:nvSpPr>
+        <p:spPr/>
+        <p:txBody>
+          <a:bodyPr/>
+          <a:lstStyle/>
+          <a:p>
+            <a:r>
+              <a:rPr lang="de-DE"/>
+              <a:t>25.03.2020</a:t>
+            </a:r>
+          </a:p>
+        </p:txBody>
+      </p:sp>
+      <p:sp>
+        <p:nvSpPr>
+          <p:cNvPr id="6" name="Foliennummernplatzhalter 5">
+            <a:extLst>
+              <a:ext uri="{FF2B5EF4-FFF2-40B4-BE49-F238E27FC236}">
+                <a16:creationId xmlns:a16="http://schemas.microsoft.com/office/drawing/2014/main" id="{2014E5A3-BB19-4CC6-A059-F359A2A51340}"/>
+              </a:ext>
+            </a:extLst>
+          </p:cNvPr>
+          <p:cNvSpPr>
+            <a:spLocks noGrp="1"/>
+          </p:cNvSpPr>
+          <p:nvPr>
+            <p:ph type="sldNum" sz="quarter" idx="12"/>
+          </p:nvPr>
+        </p:nvSpPr>
+        <p:spPr/>
+        <p:txBody>
+          <a:bodyPr/>
+          <a:lstStyle/>
+          <a:p>
+            <a:fld id="{61696EC4-B4CF-4701-AD06-A8439D6D8E12}" type="slidenum">
+              <a:rPr lang="de-DE" smtClean="0"/>
+              <a:t>12</a:t>
+            </a:fld>
+            <a:endParaRPr lang="de-DE"/>
+          </a:p>
+        </p:txBody>
+      </p:sp>
+    </p:spTree>
+    <p:extLst>
+      <p:ext uri="{BB962C8B-B14F-4D97-AF65-F5344CB8AC3E}">
+        <p14:creationId xmlns:p14="http://schemas.microsoft.com/office/powerpoint/2010/main" val="2669224639"/>
+      </p:ext>
+    </p:extLst>
+  </p:cSld>
+  <p:clrMapOvr>
+    <a:masterClrMapping/>
+  </p:clrMapOvr>
+</p:sld>
+</file>
+
+<file path=ppt/slides/slide13.xml><?xml version="1.0" encoding="utf-8"?>
+<p:sld xmlns:a="http://schemas.openxmlformats.org/drawingml/2006/main" xmlns:r="http://schemas.openxmlformats.org/officeDocument/2006/relationships" xmlns:p="http://schemas.openxmlformats.org/presentationml/2006/main">
+  <p:cSld>
+    <p:spTree>
+      <p:nvGrpSpPr>
+        <p:cNvPr id="1" name=""/>
+        <p:cNvGrpSpPr/>
+        <p:nvPr/>
+      </p:nvGrpSpPr>
+      <p:grpSpPr>
+        <a:xfrm>
+          <a:off x="0" y="0"/>
+          <a:ext cx="0" cy="0"/>
+          <a:chOff x="0" y="0"/>
+          <a:chExt cx="0" cy="0"/>
+        </a:xfrm>
+      </p:grpSpPr>
+      <p:sp>
+        <p:nvSpPr>
+          <p:cNvPr id="2" name="Titel 1">
+            <a:extLst>
+              <a:ext uri="{FF2B5EF4-FFF2-40B4-BE49-F238E27FC236}">
+                <a16:creationId xmlns:a16="http://schemas.microsoft.com/office/drawing/2014/main" id="{4E4AE26E-BDAE-4262-A057-39AC2366A5F1}"/>
+              </a:ext>
+            </a:extLst>
+          </p:cNvPr>
+          <p:cNvSpPr>
+            <a:spLocks noGrp="1"/>
+          </p:cNvSpPr>
+          <p:nvPr>
+            <p:ph type="title"/>
+          </p:nvPr>
+        </p:nvSpPr>
+        <p:spPr>
+          <a:xfrm>
+            <a:off x="524664" y="444005"/>
+            <a:ext cx="9178008" cy="627829"/>
+          </a:xfrm>
+        </p:spPr>
+        <p:txBody>
+          <a:bodyPr/>
+          <a:lstStyle/>
+          <a:p>
+            <a:r>
+              <a:rPr lang="en-US" noProof="0" dirty="0"/>
+              <a:t>Meta-Modell (2)</a:t>
+            </a:r>
+          </a:p>
+        </p:txBody>
+      </p:sp>
+      <p:pic>
+        <p:nvPicPr>
+          <p:cNvPr id="7" name="Inhaltsplatzhalter 6">
+            <a:extLst>
+              <a:ext uri="{FF2B5EF4-FFF2-40B4-BE49-F238E27FC236}">
+                <a16:creationId xmlns:a16="http://schemas.microsoft.com/office/drawing/2014/main" id="{84EBC7FC-1EE8-0648-884C-272B49BEAE15}"/>
+              </a:ext>
+            </a:extLst>
+          </p:cNvPr>
+          <p:cNvPicPr>
+            <a:picLocks noGrp="1" noChangeAspect="1"/>
+          </p:cNvPicPr>
+          <p:nvPr>
+            <p:ph idx="1"/>
+          </p:nvPr>
+        </p:nvPicPr>
+        <p:blipFill>
+          <a:blip r:embed="rId2">
+            <a:extLst>
+              <a:ext uri="{28A0092B-C50C-407E-A947-70E740481C1C}">
+                <a14:useLocalDpi xmlns:a14="http://schemas.microsoft.com/office/drawing/2010/main" val="0"/>
+              </a:ext>
+            </a:extLst>
+          </a:blip>
+          <a:stretch>
+            <a:fillRect/>
+          </a:stretch>
+        </p:blipFill>
+        <p:spPr>
+          <a:xfrm>
+            <a:off x="2899592" y="1270000"/>
+            <a:ext cx="6392816" cy="4502150"/>
+          </a:xfrm>
+        </p:spPr>
+      </p:pic>
+      <p:sp>
+        <p:nvSpPr>
+          <p:cNvPr id="4" name="Datumsplatzhalter 3">
+            <a:extLst>
+              <a:ext uri="{FF2B5EF4-FFF2-40B4-BE49-F238E27FC236}">
+                <a16:creationId xmlns:a16="http://schemas.microsoft.com/office/drawing/2014/main" id="{9CCAFD67-B02A-4CC5-A0AF-41ECCAE2B82F}"/>
+              </a:ext>
+            </a:extLst>
+          </p:cNvPr>
+          <p:cNvSpPr>
+            <a:spLocks noGrp="1"/>
+          </p:cNvSpPr>
+          <p:nvPr>
+            <p:ph type="dt" sz="half" idx="10"/>
+          </p:nvPr>
+        </p:nvSpPr>
+        <p:spPr/>
+        <p:txBody>
+          <a:bodyPr/>
+          <a:lstStyle/>
+          <a:p>
+            <a:r>
+              <a:rPr lang="de-DE"/>
+              <a:t>25.03.2020</a:t>
+            </a:r>
+          </a:p>
+        </p:txBody>
+      </p:sp>
+      <p:sp>
+        <p:nvSpPr>
+          <p:cNvPr id="6" name="Foliennummernplatzhalter 5">
+            <a:extLst>
+              <a:ext uri="{FF2B5EF4-FFF2-40B4-BE49-F238E27FC236}">
+                <a16:creationId xmlns:a16="http://schemas.microsoft.com/office/drawing/2014/main" id="{2014E5A3-BB19-4CC6-A059-F359A2A51340}"/>
+              </a:ext>
+            </a:extLst>
+          </p:cNvPr>
+          <p:cNvSpPr>
+            <a:spLocks noGrp="1"/>
+          </p:cNvSpPr>
+          <p:nvPr>
+            <p:ph type="sldNum" sz="quarter" idx="12"/>
+          </p:nvPr>
+        </p:nvSpPr>
+        <p:spPr/>
+        <p:txBody>
+          <a:bodyPr/>
+          <a:lstStyle/>
+          <a:p>
+            <a:fld id="{61696EC4-B4CF-4701-AD06-A8439D6D8E12}" type="slidenum">
+              <a:rPr lang="de-DE" smtClean="0"/>
+              <a:t>13</a:t>
+            </a:fld>
+            <a:endParaRPr lang="de-DE"/>
+          </a:p>
+        </p:txBody>
+      </p:sp>
+    </p:spTree>
+    <p:extLst>
+      <p:ext uri="{BB962C8B-B14F-4D97-AF65-F5344CB8AC3E}">
+        <p14:creationId xmlns:p14="http://schemas.microsoft.com/office/powerpoint/2010/main" val="457514926"/>
+      </p:ext>
+    </p:extLst>
+  </p:cSld>
+  <p:clrMapOvr>
+    <a:masterClrMapping/>
+  </p:clrMapOvr>
+</p:sld>
+</file>
+
+<file path=ppt/slides/slide14.xml><?xml version="1.0" encoding="utf-8"?>
+<p:sld xmlns:a="http://schemas.openxmlformats.org/drawingml/2006/main" xmlns:r="http://schemas.openxmlformats.org/officeDocument/2006/relationships" xmlns:p="http://schemas.openxmlformats.org/presentationml/2006/main">
+  <p:cSld>
+    <p:spTree>
+      <p:nvGrpSpPr>
+        <p:cNvPr id="1" name=""/>
+        <p:cNvGrpSpPr/>
+        <p:nvPr/>
+      </p:nvGrpSpPr>
+      <p:grpSpPr>
+        <a:xfrm>
+          <a:off x="0" y="0"/>
+          <a:ext cx="0" cy="0"/>
+          <a:chOff x="0" y="0"/>
+          <a:chExt cx="0" cy="0"/>
+        </a:xfrm>
+      </p:grpSpPr>
+      <p:sp>
+        <p:nvSpPr>
+          <p:cNvPr id="2" name="Titel 1">
+            <a:extLst>
+              <a:ext uri="{FF2B5EF4-FFF2-40B4-BE49-F238E27FC236}">
+                <a16:creationId xmlns:a16="http://schemas.microsoft.com/office/drawing/2014/main" id="{4E4AE26E-BDAE-4262-A057-39AC2366A5F1}"/>
+              </a:ext>
+            </a:extLst>
+          </p:cNvPr>
+          <p:cNvSpPr>
+            <a:spLocks noGrp="1"/>
+          </p:cNvSpPr>
+          <p:nvPr>
+            <p:ph type="title"/>
+          </p:nvPr>
+        </p:nvSpPr>
+        <p:spPr>
+          <a:xfrm>
+            <a:off x="524664" y="444005"/>
+            <a:ext cx="9178008" cy="627829"/>
+          </a:xfrm>
+        </p:spPr>
+        <p:txBody>
+          <a:bodyPr/>
+          <a:lstStyle/>
+          <a:p>
+            <a:r>
+              <a:rPr lang="en-US" noProof="0" dirty="0"/>
+              <a:t>Meta-Modell (3)</a:t>
+            </a:r>
+          </a:p>
+        </p:txBody>
+      </p:sp>
+      <p:pic>
+        <p:nvPicPr>
+          <p:cNvPr id="7" name="Inhaltsplatzhalter 6">
+            <a:extLst>
+              <a:ext uri="{FF2B5EF4-FFF2-40B4-BE49-F238E27FC236}">
+                <a16:creationId xmlns:a16="http://schemas.microsoft.com/office/drawing/2014/main" id="{597271BE-975A-8448-8890-95AC9CA9A263}"/>
+              </a:ext>
+            </a:extLst>
+          </p:cNvPr>
+          <p:cNvPicPr>
+            <a:picLocks noGrp="1" noChangeAspect="1"/>
+          </p:cNvPicPr>
+          <p:nvPr>
+            <p:ph idx="1"/>
+          </p:nvPr>
+        </p:nvPicPr>
+        <p:blipFill>
+          <a:blip r:embed="rId2">
+            <a:extLst>
+              <a:ext uri="{28A0092B-C50C-407E-A947-70E740481C1C}">
+                <a14:useLocalDpi xmlns:a14="http://schemas.microsoft.com/office/drawing/2010/main" val="0"/>
+              </a:ext>
+            </a:extLst>
+          </a:blip>
+          <a:stretch>
+            <a:fillRect/>
+          </a:stretch>
+        </p:blipFill>
+        <p:spPr>
+          <a:xfrm>
+            <a:off x="3615691" y="1270000"/>
+            <a:ext cx="4960617" cy="4502150"/>
+          </a:xfrm>
+        </p:spPr>
+      </p:pic>
+      <p:sp>
+        <p:nvSpPr>
+          <p:cNvPr id="4" name="Datumsplatzhalter 3">
+            <a:extLst>
+              <a:ext uri="{FF2B5EF4-FFF2-40B4-BE49-F238E27FC236}">
+                <a16:creationId xmlns:a16="http://schemas.microsoft.com/office/drawing/2014/main" id="{9CCAFD67-B02A-4CC5-A0AF-41ECCAE2B82F}"/>
+              </a:ext>
+            </a:extLst>
+          </p:cNvPr>
+          <p:cNvSpPr>
+            <a:spLocks noGrp="1"/>
+          </p:cNvSpPr>
+          <p:nvPr>
+            <p:ph type="dt" sz="half" idx="10"/>
+          </p:nvPr>
+        </p:nvSpPr>
+        <p:spPr/>
+        <p:txBody>
+          <a:bodyPr/>
+          <a:lstStyle/>
+          <a:p>
+            <a:r>
+              <a:rPr lang="de-DE"/>
+              <a:t>25.03.2020</a:t>
+            </a:r>
+          </a:p>
+        </p:txBody>
+      </p:sp>
+      <p:sp>
+        <p:nvSpPr>
+          <p:cNvPr id="6" name="Foliennummernplatzhalter 5">
+            <a:extLst>
+              <a:ext uri="{FF2B5EF4-FFF2-40B4-BE49-F238E27FC236}">
+                <a16:creationId xmlns:a16="http://schemas.microsoft.com/office/drawing/2014/main" id="{2014E5A3-BB19-4CC6-A059-F359A2A51340}"/>
+              </a:ext>
+            </a:extLst>
+          </p:cNvPr>
+          <p:cNvSpPr>
+            <a:spLocks noGrp="1"/>
+          </p:cNvSpPr>
+          <p:nvPr>
+            <p:ph type="sldNum" sz="quarter" idx="12"/>
+          </p:nvPr>
+        </p:nvSpPr>
+        <p:spPr/>
+        <p:txBody>
+          <a:bodyPr/>
+          <a:lstStyle/>
+          <a:p>
+            <a:fld id="{61696EC4-B4CF-4701-AD06-A8439D6D8E12}" type="slidenum">
+              <a:rPr lang="de-DE" smtClean="0"/>
+              <a:t>14</a:t>
+            </a:fld>
+            <a:endParaRPr lang="de-DE"/>
+          </a:p>
+        </p:txBody>
+      </p:sp>
+    </p:spTree>
+    <p:extLst>
+      <p:ext uri="{BB962C8B-B14F-4D97-AF65-F5344CB8AC3E}">
+        <p14:creationId xmlns:p14="http://schemas.microsoft.com/office/powerpoint/2010/main" val="1840141399"/>
+      </p:ext>
+    </p:extLst>
+  </p:cSld>
+  <p:clrMapOvr>
+    <a:masterClrMapping/>
+  </p:clrMapOvr>
+</p:sld>
+</file>
+
+<file path=ppt/slides/slide15.xml><?xml version="1.0" encoding="utf-8"?>
+<p:sld xmlns:a="http://schemas.openxmlformats.org/drawingml/2006/main" xmlns:r="http://schemas.openxmlformats.org/officeDocument/2006/relationships" xmlns:p="http://schemas.openxmlformats.org/presentationml/2006/main">
+  <p:cSld>
+    <p:spTree>
+      <p:nvGrpSpPr>
+        <p:cNvPr id="1" name=""/>
+        <p:cNvGrpSpPr/>
+        <p:nvPr/>
+      </p:nvGrpSpPr>
+      <p:grpSpPr>
+        <a:xfrm>
+          <a:off x="0" y="0"/>
+          <a:ext cx="0" cy="0"/>
+          <a:chOff x="0" y="0"/>
+          <a:chExt cx="0" cy="0"/>
+        </a:xfrm>
+      </p:grpSpPr>
+      <p:sp>
+        <p:nvSpPr>
+          <p:cNvPr id="2" name="Titel 1">
+            <a:extLst>
+              <a:ext uri="{FF2B5EF4-FFF2-40B4-BE49-F238E27FC236}">
+                <a16:creationId xmlns:a16="http://schemas.microsoft.com/office/drawing/2014/main" id="{4E4AE26E-BDAE-4262-A057-39AC2366A5F1}"/>
+              </a:ext>
+            </a:extLst>
+          </p:cNvPr>
+          <p:cNvSpPr>
+            <a:spLocks noGrp="1"/>
+          </p:cNvSpPr>
+          <p:nvPr>
+            <p:ph type="title"/>
+          </p:nvPr>
+        </p:nvSpPr>
+        <p:spPr>
+          <a:xfrm>
+            <a:off x="524664" y="444005"/>
+            <a:ext cx="9178008" cy="627829"/>
+          </a:xfrm>
+        </p:spPr>
+        <p:txBody>
+          <a:bodyPr/>
+          <a:lstStyle/>
+          <a:p>
+            <a:r>
+              <a:rPr lang="en-US" noProof="0" dirty="0"/>
+              <a:t>Meta-Modell (4)</a:t>
+            </a:r>
+          </a:p>
+        </p:txBody>
+      </p:sp>
+      <p:pic>
+        <p:nvPicPr>
+          <p:cNvPr id="7" name="Inhaltsplatzhalter 6" descr="Ein Bild, das Screenshot enthält.&#10;&#10;Automatisch generierte Beschreibung">
+            <a:extLst>
+              <a:ext uri="{FF2B5EF4-FFF2-40B4-BE49-F238E27FC236}">
+                <a16:creationId xmlns:a16="http://schemas.microsoft.com/office/drawing/2014/main" id="{69BFE89E-4FB3-B845-BE66-7A1F3B0E16C1}"/>
+              </a:ext>
+            </a:extLst>
+          </p:cNvPr>
+          <p:cNvPicPr>
+            <a:picLocks noGrp="1" noChangeAspect="1"/>
+          </p:cNvPicPr>
+          <p:nvPr>
+            <p:ph idx="1"/>
+          </p:nvPr>
+        </p:nvPicPr>
+        <p:blipFill>
+          <a:blip r:embed="rId2">
+            <a:extLst>
+              <a:ext uri="{28A0092B-C50C-407E-A947-70E740481C1C}">
+                <a14:useLocalDpi xmlns:a14="http://schemas.microsoft.com/office/drawing/2010/main" val="0"/>
+              </a:ext>
+            </a:extLst>
+          </a:blip>
+          <a:stretch>
+            <a:fillRect/>
+          </a:stretch>
+        </p:blipFill>
+        <p:spPr>
+          <a:xfrm>
+            <a:off x="3236526" y="1270000"/>
+            <a:ext cx="5718947" cy="4502150"/>
+          </a:xfrm>
+        </p:spPr>
+      </p:pic>
+      <p:sp>
+        <p:nvSpPr>
+          <p:cNvPr id="4" name="Datumsplatzhalter 3">
+            <a:extLst>
+              <a:ext uri="{FF2B5EF4-FFF2-40B4-BE49-F238E27FC236}">
+                <a16:creationId xmlns:a16="http://schemas.microsoft.com/office/drawing/2014/main" id="{9CCAFD67-B02A-4CC5-A0AF-41ECCAE2B82F}"/>
+              </a:ext>
+            </a:extLst>
+          </p:cNvPr>
+          <p:cNvSpPr>
+            <a:spLocks noGrp="1"/>
+          </p:cNvSpPr>
+          <p:nvPr>
+            <p:ph type="dt" sz="half" idx="10"/>
+          </p:nvPr>
+        </p:nvSpPr>
+        <p:spPr/>
+        <p:txBody>
+          <a:bodyPr/>
+          <a:lstStyle/>
+          <a:p>
+            <a:r>
+              <a:rPr lang="de-DE"/>
+              <a:t>25.03.2020</a:t>
+            </a:r>
+          </a:p>
+        </p:txBody>
+      </p:sp>
+      <p:sp>
+        <p:nvSpPr>
+          <p:cNvPr id="6" name="Foliennummernplatzhalter 5">
+            <a:extLst>
+              <a:ext uri="{FF2B5EF4-FFF2-40B4-BE49-F238E27FC236}">
+                <a16:creationId xmlns:a16="http://schemas.microsoft.com/office/drawing/2014/main" id="{2014E5A3-BB19-4CC6-A059-F359A2A51340}"/>
+              </a:ext>
+            </a:extLst>
+          </p:cNvPr>
+          <p:cNvSpPr>
+            <a:spLocks noGrp="1"/>
+          </p:cNvSpPr>
+          <p:nvPr>
+            <p:ph type="sldNum" sz="quarter" idx="12"/>
+          </p:nvPr>
+        </p:nvSpPr>
+        <p:spPr/>
+        <p:txBody>
+          <a:bodyPr/>
+          <a:lstStyle/>
+          <a:p>
+            <a:fld id="{61696EC4-B4CF-4701-AD06-A8439D6D8E12}" type="slidenum">
+              <a:rPr lang="de-DE" smtClean="0"/>
+              <a:t>15</a:t>
+            </a:fld>
+            <a:endParaRPr lang="de-DE"/>
+          </a:p>
+        </p:txBody>
+      </p:sp>
+    </p:spTree>
+    <p:extLst>
+      <p:ext uri="{BB962C8B-B14F-4D97-AF65-F5344CB8AC3E}">
+        <p14:creationId xmlns:p14="http://schemas.microsoft.com/office/powerpoint/2010/main" val="2735828084"/>
+      </p:ext>
+    </p:extLst>
+  </p:cSld>
+  <p:clrMapOvr>
+    <a:masterClrMapping/>
+  </p:clrMapOvr>
+</p:sld>
+</file>
+
+<file path=ppt/slides/slide16.xml><?xml version="1.0" encoding="utf-8"?>
+<p:sld xmlns:a="http://schemas.openxmlformats.org/drawingml/2006/main" xmlns:r="http://schemas.openxmlformats.org/officeDocument/2006/relationships" xmlns:p="http://schemas.openxmlformats.org/presentationml/2006/main">
+  <p:cSld>
+    <p:spTree>
+      <p:nvGrpSpPr>
+        <p:cNvPr id="1" name=""/>
+        <p:cNvGrpSpPr/>
+        <p:nvPr/>
+      </p:nvGrpSpPr>
+      <p:grpSpPr>
+        <a:xfrm>
+          <a:off x="0" y="0"/>
+          <a:ext cx="0" cy="0"/>
+          <a:chOff x="0" y="0"/>
+          <a:chExt cx="0" cy="0"/>
+        </a:xfrm>
+      </p:grpSpPr>
+      <p:sp>
+        <p:nvSpPr>
+          <p:cNvPr id="2" name="Titel 1">
+            <a:extLst>
+              <a:ext uri="{FF2B5EF4-FFF2-40B4-BE49-F238E27FC236}">
+                <a16:creationId xmlns:a16="http://schemas.microsoft.com/office/drawing/2014/main" id="{4E4AE26E-BDAE-4262-A057-39AC2366A5F1}"/>
+              </a:ext>
+            </a:extLst>
+          </p:cNvPr>
+          <p:cNvSpPr>
+            <a:spLocks noGrp="1"/>
+          </p:cNvSpPr>
+          <p:nvPr>
+            <p:ph type="title"/>
+          </p:nvPr>
+        </p:nvSpPr>
+        <p:spPr>
+          <a:xfrm>
+            <a:off x="524664" y="444005"/>
+            <a:ext cx="9178008" cy="627829"/>
+          </a:xfrm>
+        </p:spPr>
+        <p:txBody>
+          <a:bodyPr/>
+          <a:lstStyle/>
+          <a:p>
+            <a:r>
+              <a:rPr lang="en-US" noProof="0" dirty="0"/>
+              <a:t>Meta-Modell (5)</a:t>
+            </a:r>
+          </a:p>
+        </p:txBody>
+      </p:sp>
+      <p:pic>
+        <p:nvPicPr>
+          <p:cNvPr id="7" name="Inhaltsplatzhalter 6" descr="Ein Bild, das Screenshot enthält.&#10;&#10;Automatisch generierte Beschreibung">
+            <a:extLst>
+              <a:ext uri="{FF2B5EF4-FFF2-40B4-BE49-F238E27FC236}">
+                <a16:creationId xmlns:a16="http://schemas.microsoft.com/office/drawing/2014/main" id="{62C7D3AB-7537-E546-BC76-8768A15A3C62}"/>
+              </a:ext>
+            </a:extLst>
+          </p:cNvPr>
+          <p:cNvPicPr>
+            <a:picLocks noGrp="1" noChangeAspect="1"/>
+          </p:cNvPicPr>
+          <p:nvPr>
+            <p:ph idx="1"/>
+          </p:nvPr>
+        </p:nvPicPr>
+        <p:blipFill>
+          <a:blip r:embed="rId2">
+            <a:extLst>
+              <a:ext uri="{28A0092B-C50C-407E-A947-70E740481C1C}">
+                <a14:useLocalDpi xmlns:a14="http://schemas.microsoft.com/office/drawing/2010/main" val="0"/>
+              </a:ext>
+            </a:extLst>
+          </a:blip>
+          <a:stretch>
+            <a:fillRect/>
+          </a:stretch>
+        </p:blipFill>
+        <p:spPr>
+          <a:xfrm>
+            <a:off x="3149612" y="1270000"/>
+            <a:ext cx="5892775" cy="4502150"/>
+          </a:xfrm>
+        </p:spPr>
+      </p:pic>
+      <p:sp>
+        <p:nvSpPr>
+          <p:cNvPr id="4" name="Datumsplatzhalter 3">
+            <a:extLst>
+              <a:ext uri="{FF2B5EF4-FFF2-40B4-BE49-F238E27FC236}">
+                <a16:creationId xmlns:a16="http://schemas.microsoft.com/office/drawing/2014/main" id="{9CCAFD67-B02A-4CC5-A0AF-41ECCAE2B82F}"/>
+              </a:ext>
+            </a:extLst>
+          </p:cNvPr>
+          <p:cNvSpPr>
+            <a:spLocks noGrp="1"/>
+          </p:cNvSpPr>
+          <p:nvPr>
+            <p:ph type="dt" sz="half" idx="10"/>
+          </p:nvPr>
+        </p:nvSpPr>
+        <p:spPr/>
+        <p:txBody>
+          <a:bodyPr/>
+          <a:lstStyle/>
+          <a:p>
+            <a:r>
+              <a:rPr lang="de-DE"/>
+              <a:t>25.03.2020</a:t>
+            </a:r>
+          </a:p>
+        </p:txBody>
+      </p:sp>
+      <p:sp>
+        <p:nvSpPr>
+          <p:cNvPr id="6" name="Foliennummernplatzhalter 5">
+            <a:extLst>
+              <a:ext uri="{FF2B5EF4-FFF2-40B4-BE49-F238E27FC236}">
+                <a16:creationId xmlns:a16="http://schemas.microsoft.com/office/drawing/2014/main" id="{2014E5A3-BB19-4CC6-A059-F359A2A51340}"/>
+              </a:ext>
+            </a:extLst>
+          </p:cNvPr>
+          <p:cNvSpPr>
+            <a:spLocks noGrp="1"/>
+          </p:cNvSpPr>
+          <p:nvPr>
+            <p:ph type="sldNum" sz="quarter" idx="12"/>
+          </p:nvPr>
+        </p:nvSpPr>
+        <p:spPr/>
+        <p:txBody>
+          <a:bodyPr/>
+          <a:lstStyle/>
+          <a:p>
+            <a:fld id="{61696EC4-B4CF-4701-AD06-A8439D6D8E12}" type="slidenum">
+              <a:rPr lang="de-DE" smtClean="0"/>
+              <a:t>16</a:t>
+            </a:fld>
+            <a:endParaRPr lang="de-DE"/>
+          </a:p>
+        </p:txBody>
+      </p:sp>
+    </p:spTree>
+    <p:extLst>
+      <p:ext uri="{BB962C8B-B14F-4D97-AF65-F5344CB8AC3E}">
+        <p14:creationId xmlns:p14="http://schemas.microsoft.com/office/powerpoint/2010/main" val="1226132527"/>
+      </p:ext>
+    </p:extLst>
+  </p:cSld>
+  <p:clrMapOvr>
+    <a:masterClrMapping/>
+  </p:clrMapOvr>
+</p:sld>
+</file>
+
+<file path=ppt/slides/slide17.xml><?xml version="1.0" encoding="utf-8"?>
+<p:sld xmlns:a="http://schemas.openxmlformats.org/drawingml/2006/main" xmlns:r="http://schemas.openxmlformats.org/officeDocument/2006/relationships" xmlns:p="http://schemas.openxmlformats.org/presentationml/2006/main">
+  <p:cSld>
+    <p:spTree>
+      <p:nvGrpSpPr>
+        <p:cNvPr id="1" name=""/>
+        <p:cNvGrpSpPr/>
+        <p:nvPr/>
+      </p:nvGrpSpPr>
+      <p:grpSpPr>
+        <a:xfrm>
+          <a:off x="0" y="0"/>
+          <a:ext cx="0" cy="0"/>
+          <a:chOff x="0" y="0"/>
+          <a:chExt cx="0" cy="0"/>
+        </a:xfrm>
+      </p:grpSpPr>
+      <p:sp>
+        <p:nvSpPr>
+          <p:cNvPr id="2" name="Titel 1">
+            <a:extLst>
+              <a:ext uri="{FF2B5EF4-FFF2-40B4-BE49-F238E27FC236}">
+                <a16:creationId xmlns:a16="http://schemas.microsoft.com/office/drawing/2014/main" id="{4E4AE26E-BDAE-4262-A057-39AC2366A5F1}"/>
+              </a:ext>
+            </a:extLst>
+          </p:cNvPr>
+          <p:cNvSpPr>
+            <a:spLocks noGrp="1"/>
+          </p:cNvSpPr>
+          <p:nvPr>
+            <p:ph type="title"/>
+          </p:nvPr>
+        </p:nvSpPr>
+        <p:spPr>
+          <a:xfrm>
+            <a:off x="524664" y="444005"/>
+            <a:ext cx="9178008" cy="627829"/>
+          </a:xfrm>
+        </p:spPr>
+        <p:txBody>
+          <a:bodyPr/>
+          <a:lstStyle/>
+          <a:p>
+            <a:r>
+              <a:rPr lang="en-US" noProof="0" dirty="0" err="1"/>
+              <a:t>Zusammenfassung</a:t>
+            </a:r>
+            <a:endParaRPr lang="en-US" noProof="0" dirty="0"/>
+          </a:p>
+        </p:txBody>
+      </p:sp>
+      <p:sp>
+        <p:nvSpPr>
+          <p:cNvPr id="3" name="Inhaltsplatzhalter 2">
+            <a:extLst>
+              <a:ext uri="{FF2B5EF4-FFF2-40B4-BE49-F238E27FC236}">
+                <a16:creationId xmlns:a16="http://schemas.microsoft.com/office/drawing/2014/main" id="{900E3307-8428-4C7A-A1DA-C96FE547A036}"/>
+              </a:ext>
+            </a:extLst>
+          </p:cNvPr>
+          <p:cNvSpPr>
+            <a:spLocks noGrp="1"/>
+          </p:cNvSpPr>
+          <p:nvPr>
+            <p:ph idx="1"/>
+          </p:nvPr>
+        </p:nvSpPr>
+        <p:spPr>
+          <a:xfrm>
+            <a:off x="524664" y="1269207"/>
+            <a:ext cx="11142672" cy="4502318"/>
+          </a:xfrm>
+        </p:spPr>
+        <p:txBody>
+          <a:bodyPr/>
+          <a:lstStyle/>
+          <a:p>
+            <a:pPr>
+              <a:lnSpc>
+                <a:spcPct val="100000"/>
+              </a:lnSpc>
+            </a:pPr>
+            <a:endParaRPr lang="de-DE" dirty="0"/>
+          </a:p>
+        </p:txBody>
+      </p:sp>
+      <p:sp>
+        <p:nvSpPr>
+          <p:cNvPr id="4" name="Datumsplatzhalter 3">
+            <a:extLst>
+              <a:ext uri="{FF2B5EF4-FFF2-40B4-BE49-F238E27FC236}">
+                <a16:creationId xmlns:a16="http://schemas.microsoft.com/office/drawing/2014/main" id="{9CCAFD67-B02A-4CC5-A0AF-41ECCAE2B82F}"/>
+              </a:ext>
+            </a:extLst>
+          </p:cNvPr>
+          <p:cNvSpPr>
+            <a:spLocks noGrp="1"/>
+          </p:cNvSpPr>
+          <p:nvPr>
+            <p:ph type="dt" sz="half" idx="10"/>
+          </p:nvPr>
+        </p:nvSpPr>
+        <p:spPr/>
+        <p:txBody>
+          <a:bodyPr/>
+          <a:lstStyle/>
+          <a:p>
+            <a:r>
+              <a:rPr lang="de-DE"/>
+              <a:t>25.03.2020</a:t>
+            </a:r>
+          </a:p>
+        </p:txBody>
+      </p:sp>
+      <p:sp>
+        <p:nvSpPr>
+          <p:cNvPr id="6" name="Foliennummernplatzhalter 5">
+            <a:extLst>
+              <a:ext uri="{FF2B5EF4-FFF2-40B4-BE49-F238E27FC236}">
+                <a16:creationId xmlns:a16="http://schemas.microsoft.com/office/drawing/2014/main" id="{2014E5A3-BB19-4CC6-A059-F359A2A51340}"/>
+              </a:ext>
+            </a:extLst>
+          </p:cNvPr>
+          <p:cNvSpPr>
+            <a:spLocks noGrp="1"/>
+          </p:cNvSpPr>
+          <p:nvPr>
+            <p:ph type="sldNum" sz="quarter" idx="12"/>
+          </p:nvPr>
+        </p:nvSpPr>
+        <p:spPr/>
+        <p:txBody>
+          <a:bodyPr/>
+          <a:lstStyle/>
+          <a:p>
+            <a:fld id="{61696EC4-B4CF-4701-AD06-A8439D6D8E12}" type="slidenum">
+              <a:rPr lang="de-DE" smtClean="0"/>
+              <a:t>17</a:t>
             </a:fld>
             <a:endParaRPr lang="de-DE"/>
           </a:p>
@@ -7457,6 +8889,33 @@
               <a:t>Notwendige vs. hinreichende Kriterien</a:t>
             </a:r>
           </a:p>
+          <a:p>
+            <a:pPr lvl="1">
+              <a:lnSpc>
+                <a:spcPct val="100000"/>
+              </a:lnSpc>
+            </a:pPr>
+            <a:r>
+              <a:rPr lang="de-DE" dirty="0"/>
+              <a:t>„</a:t>
+            </a:r>
+            <a:r>
+              <a:rPr lang="de-DE" dirty="0" err="1"/>
+              <a:t>Greedy</a:t>
+            </a:r>
+            <a:r>
+              <a:rPr lang="de-DE" dirty="0"/>
+              <a:t>“-Strategie möglich?</a:t>
+            </a:r>
+          </a:p>
+          <a:p>
+            <a:pPr lvl="1">
+              <a:lnSpc>
+                <a:spcPct val="100000"/>
+              </a:lnSpc>
+            </a:pPr>
+            <a:endParaRPr lang="de-DE" dirty="0"/>
+          </a:p>
         </p:txBody>
       </p:sp>
       <p:sp>
@@ -7513,6 +8972,266 @@
               <a:t>9</a:t>
             </a:fld>
             <a:endParaRPr lang="de-DE"/>
+          </a:p>
+        </p:txBody>
+      </p:sp>
+      <p:sp>
+        <p:nvSpPr>
+          <p:cNvPr id="7" name="Inhaltsplatzhalter 2">
+            <a:extLst>
+              <a:ext uri="{FF2B5EF4-FFF2-40B4-BE49-F238E27FC236}">
+                <a16:creationId xmlns:a16="http://schemas.microsoft.com/office/drawing/2014/main" id="{8AAF696D-35E6-C94A-816B-16AC4067B035}"/>
+              </a:ext>
+            </a:extLst>
+          </p:cNvPr>
+          <p:cNvSpPr txBox="1">
+            <a:spLocks/>
+          </p:cNvSpPr>
+          <p:nvPr/>
+        </p:nvSpPr>
+        <p:spPr>
+          <a:xfrm>
+            <a:off x="6096000" y="2606566"/>
+            <a:ext cx="11142672" cy="4502318"/>
+          </a:xfrm>
+          <a:prstGeom prst="rect">
+            <a:avLst/>
+          </a:prstGeom>
+        </p:spPr>
+        <p:txBody>
+          <a:bodyPr vert="horz" lIns="0" tIns="0" rIns="0" bIns="0" rtlCol="0">
+            <a:normAutofit/>
+          </a:bodyPr>
+          <a:lstStyle>
+            <a:lvl1pPr marL="361950" indent="-361950" algn="l" defTabSz="914400" rtl="0" eaLnBrk="1" latinLnBrk="0" hangingPunct="1">
+              <a:lnSpc>
+                <a:spcPct val="90000"/>
+              </a:lnSpc>
+              <a:spcBef>
+                <a:spcPts val="600"/>
+              </a:spcBef>
+              <a:buSzPct val="88000"/>
+              <a:buFontTx/>
+              <a:buBlip>
+                <a:blip r:embed="rId2"/>
+              </a:buBlip>
+              <a:defRPr sz="2800" kern="1200">
+                <a:solidFill>
+                  <a:schemeClr val="tx1"/>
+                </a:solidFill>
+                <a:latin typeface="+mn-lt"/>
+                <a:ea typeface="+mn-ea"/>
+                <a:cs typeface="+mn-cs"/>
+              </a:defRPr>
+            </a:lvl1pPr>
+            <a:lvl2pPr marL="809625" indent="-361950" algn="l" defTabSz="914400" rtl="0" eaLnBrk="1" latinLnBrk="0" hangingPunct="1">
+              <a:lnSpc>
+                <a:spcPct val="90000"/>
+              </a:lnSpc>
+              <a:spcBef>
+                <a:spcPts val="600"/>
+              </a:spcBef>
+              <a:buSzPct val="88000"/>
+              <a:buFontTx/>
+              <a:buBlip>
+                <a:blip r:embed="rId2"/>
+              </a:buBlip>
+              <a:defRPr sz="2400" kern="1200">
+                <a:solidFill>
+                  <a:schemeClr val="tx1"/>
+                </a:solidFill>
+                <a:latin typeface="+mn-lt"/>
+                <a:ea typeface="+mn-ea"/>
+                <a:cs typeface="+mn-cs"/>
+              </a:defRPr>
+            </a:lvl2pPr>
+            <a:lvl3pPr marL="1257300" indent="-361950" algn="l" defTabSz="914400" rtl="0" eaLnBrk="1" latinLnBrk="0" hangingPunct="1">
+              <a:lnSpc>
+                <a:spcPct val="90000"/>
+              </a:lnSpc>
+              <a:spcBef>
+                <a:spcPts val="600"/>
+              </a:spcBef>
+              <a:buSzPct val="88000"/>
+              <a:buFontTx/>
+              <a:buBlip>
+                <a:blip r:embed="rId2"/>
+              </a:buBlip>
+              <a:defRPr sz="2000" kern="1200">
+                <a:solidFill>
+                  <a:schemeClr val="tx1"/>
+                </a:solidFill>
+                <a:latin typeface="+mn-lt"/>
+                <a:ea typeface="+mn-ea"/>
+                <a:cs typeface="+mn-cs"/>
+              </a:defRPr>
+            </a:lvl3pPr>
+            <a:lvl4pPr marL="1704975" indent="-361950" algn="l" defTabSz="914400" rtl="0" eaLnBrk="1" latinLnBrk="0" hangingPunct="1">
+              <a:lnSpc>
+                <a:spcPct val="90000"/>
+              </a:lnSpc>
+              <a:spcBef>
+                <a:spcPts val="600"/>
+              </a:spcBef>
+              <a:buSzPct val="88000"/>
+              <a:buFontTx/>
+              <a:buBlip>
+                <a:blip r:embed="rId2"/>
+              </a:buBlip>
+              <a:defRPr sz="2000" kern="1200">
+                <a:solidFill>
+                  <a:schemeClr val="tx1"/>
+                </a:solidFill>
+                <a:latin typeface="+mn-lt"/>
+                <a:ea typeface="+mn-ea"/>
+                <a:cs typeface="+mn-cs"/>
+              </a:defRPr>
+            </a:lvl4pPr>
+            <a:lvl5pPr marL="2152650" indent="-361950" algn="l" defTabSz="914400" rtl="0" eaLnBrk="1" latinLnBrk="0" hangingPunct="1">
+              <a:lnSpc>
+                <a:spcPct val="90000"/>
+              </a:lnSpc>
+              <a:spcBef>
+                <a:spcPts val="600"/>
+              </a:spcBef>
+              <a:buSzPct val="88000"/>
+              <a:buFontTx/>
+              <a:buBlip>
+                <a:blip r:embed="rId2"/>
+              </a:buBlip>
+              <a:defRPr sz="2000" kern="1200">
+                <a:solidFill>
+                  <a:schemeClr val="tx1"/>
+                </a:solidFill>
+                <a:latin typeface="+mn-lt"/>
+                <a:ea typeface="+mn-ea"/>
+                <a:cs typeface="+mn-cs"/>
+              </a:defRPr>
+            </a:lvl5pPr>
+            <a:lvl6pPr marL="2514600" indent="-228600" algn="l" defTabSz="914400" rtl="0" eaLnBrk="1" latinLnBrk="0" hangingPunct="1">
+              <a:lnSpc>
+                <a:spcPct val="90000"/>
+              </a:lnSpc>
+              <a:spcBef>
+                <a:spcPts val="500"/>
+              </a:spcBef>
+              <a:buFont typeface="Arial" panose="020B0604020202020204" pitchFamily="34" charset="0"/>
+              <a:buChar char="•"/>
+              <a:defRPr sz="1800" kern="1200">
+                <a:solidFill>
+                  <a:schemeClr val="tx1"/>
+                </a:solidFill>
+                <a:latin typeface="+mn-lt"/>
+                <a:ea typeface="+mn-ea"/>
+                <a:cs typeface="+mn-cs"/>
+              </a:defRPr>
+            </a:lvl6pPr>
+            <a:lvl7pPr marL="2971800" indent="-228600" algn="l" defTabSz="914400" rtl="0" eaLnBrk="1" latinLnBrk="0" hangingPunct="1">
+              <a:lnSpc>
+                <a:spcPct val="90000"/>
+              </a:lnSpc>
+              <a:spcBef>
+                <a:spcPts val="500"/>
+              </a:spcBef>
+              <a:buFont typeface="Arial" panose="020B0604020202020204" pitchFamily="34" charset="0"/>
+              <a:buChar char="•"/>
+              <a:defRPr sz="1800" kern="1200">
+                <a:solidFill>
+                  <a:schemeClr val="tx1"/>
+                </a:solidFill>
+                <a:latin typeface="+mn-lt"/>
+                <a:ea typeface="+mn-ea"/>
+                <a:cs typeface="+mn-cs"/>
+              </a:defRPr>
+            </a:lvl7pPr>
+            <a:lvl8pPr marL="3429000" indent="-228600" algn="l" defTabSz="914400" rtl="0" eaLnBrk="1" latinLnBrk="0" hangingPunct="1">
+              <a:lnSpc>
+                <a:spcPct val="90000"/>
+              </a:lnSpc>
+              <a:spcBef>
+                <a:spcPts val="500"/>
+              </a:spcBef>
+              <a:buFont typeface="Arial" panose="020B0604020202020204" pitchFamily="34" charset="0"/>
+              <a:buChar char="•"/>
+              <a:defRPr sz="1800" kern="1200">
+                <a:solidFill>
+                  <a:schemeClr val="tx1"/>
+                </a:solidFill>
+                <a:latin typeface="+mn-lt"/>
+                <a:ea typeface="+mn-ea"/>
+                <a:cs typeface="+mn-cs"/>
+              </a:defRPr>
+            </a:lvl8pPr>
+            <a:lvl9pPr marL="3886200" indent="-228600" algn="l" defTabSz="914400" rtl="0" eaLnBrk="1" latinLnBrk="0" hangingPunct="1">
+              <a:lnSpc>
+                <a:spcPct val="90000"/>
+              </a:lnSpc>
+              <a:spcBef>
+                <a:spcPts val="500"/>
+              </a:spcBef>
+              <a:buFont typeface="Arial" panose="020B0604020202020204" pitchFamily="34" charset="0"/>
+              <a:buChar char="•"/>
+              <a:defRPr sz="1800" kern="1200">
+                <a:solidFill>
+                  <a:schemeClr val="tx1"/>
+                </a:solidFill>
+                <a:latin typeface="+mn-lt"/>
+                <a:ea typeface="+mn-ea"/>
+                <a:cs typeface="+mn-cs"/>
+              </a:defRPr>
+            </a:lvl9pPr>
+          </a:lstStyle>
+          <a:p>
+            <a:pPr>
+              <a:lnSpc>
+                <a:spcPct val="100000"/>
+              </a:lnSpc>
+            </a:pPr>
+            <a:r>
+              <a:rPr lang="de-DE" dirty="0"/>
+              <a:t>A.1 , A.2 , B ist erlaubt</a:t>
+            </a:r>
+          </a:p>
+          <a:p>
+            <a:pPr lvl="1">
+              <a:lnSpc>
+                <a:spcPct val="100000"/>
+              </a:lnSpc>
+            </a:pPr>
+            <a:r>
+              <a:rPr lang="de-DE" dirty="0"/>
+              <a:t>A.1, B nicht</a:t>
+            </a:r>
+          </a:p>
+          <a:p>
+            <a:pPr lvl="1">
+              <a:lnSpc>
+                <a:spcPct val="100000"/>
+              </a:lnSpc>
+            </a:pPr>
+            <a:r>
+              <a:rPr lang="de-DE" dirty="0"/>
+              <a:t>A.1, A.2, B.1 auch nicht</a:t>
+            </a:r>
+          </a:p>
+          <a:p>
+            <a:pPr>
+              <a:lnSpc>
+                <a:spcPct val="100000"/>
+              </a:lnSpc>
+            </a:pPr>
+            <a:r>
+              <a:rPr lang="de-DE" dirty="0"/>
+              <a:t>Knoten ist Multi-Menge</a:t>
+            </a:r>
+          </a:p>
+          <a:p>
+            <a:pPr lvl="1">
+              <a:lnSpc>
+                <a:spcPct val="100000"/>
+              </a:lnSpc>
+            </a:pPr>
+            <a:endParaRPr lang="de-DE" dirty="0"/>
           </a:p>
         </p:txBody>
       </p:sp>

</xml_diff>

<commit_message>
fix bugs and create demo sample projects
</commit_message>
<xml_diff>
--- a/presentation/presentation1.pptx
+++ b/presentation/presentation1.pptx
@@ -5,7 +5,7 @@
     <p:sldMasterId id="2147483648" r:id="rId1"/>
   </p:sldMasterIdLst>
   <p:notesMasterIdLst>
-    <p:notesMasterId r:id="rId19"/>
+    <p:notesMasterId r:id="rId20"/>
   </p:notesMasterIdLst>
   <p:sldIdLst>
     <p:sldId id="256" r:id="rId2"/>
@@ -16,15 +16,16 @@
     <p:sldId id="261" r:id="rId7"/>
     <p:sldId id="264" r:id="rId8"/>
     <p:sldId id="262" r:id="rId9"/>
-    <p:sldId id="263" r:id="rId10"/>
-    <p:sldId id="272" r:id="rId11"/>
-    <p:sldId id="265" r:id="rId12"/>
-    <p:sldId id="267" r:id="rId13"/>
-    <p:sldId id="268" r:id="rId14"/>
-    <p:sldId id="269" r:id="rId15"/>
-    <p:sldId id="270" r:id="rId16"/>
-    <p:sldId id="271" r:id="rId17"/>
-    <p:sldId id="266" r:id="rId18"/>
+    <p:sldId id="273" r:id="rId10"/>
+    <p:sldId id="263" r:id="rId11"/>
+    <p:sldId id="272" r:id="rId12"/>
+    <p:sldId id="265" r:id="rId13"/>
+    <p:sldId id="267" r:id="rId14"/>
+    <p:sldId id="268" r:id="rId15"/>
+    <p:sldId id="269" r:id="rId16"/>
+    <p:sldId id="270" r:id="rId17"/>
+    <p:sldId id="271" r:id="rId18"/>
+    <p:sldId id="266" r:id="rId19"/>
   </p:sldIdLst>
   <p:sldSz cx="12192000" cy="6858000"/>
   <p:notesSz cx="6858000" cy="9144000"/>
@@ -213,7 +214,7 @@
           <a:p>
             <a:fld id="{FA8F02CA-77CB-4E54-B712-21E588799EE8}" type="datetimeFigureOut">
               <a:rPr lang="de-DE" smtClean="0"/>
-              <a:t>07.03.20</a:t>
+              <a:t>11.03.20</a:t>
             </a:fld>
             <a:endParaRPr lang="de-DE"/>
           </a:p>
@@ -4648,6 +4649,183 @@
       </p:sp>
       <p:sp>
         <p:nvSpPr>
+          <p:cNvPr id="3" name="Inhaltsplatzhalter 2">
+            <a:extLst>
+              <a:ext uri="{FF2B5EF4-FFF2-40B4-BE49-F238E27FC236}">
+                <a16:creationId xmlns:a16="http://schemas.microsoft.com/office/drawing/2014/main" id="{900E3307-8428-4C7A-A1DA-C96FE547A036}"/>
+              </a:ext>
+            </a:extLst>
+          </p:cNvPr>
+          <p:cNvSpPr>
+            <a:spLocks noGrp="1"/>
+          </p:cNvSpPr>
+          <p:nvPr>
+            <p:ph idx="1"/>
+          </p:nvPr>
+        </p:nvSpPr>
+        <p:spPr>
+          <a:xfrm>
+            <a:off x="524664" y="1269207"/>
+            <a:ext cx="11142672" cy="4502318"/>
+          </a:xfrm>
+        </p:spPr>
+        <p:txBody>
+          <a:bodyPr>
+            <a:normAutofit lnSpcReduction="10000"/>
+          </a:bodyPr>
+          <a:lstStyle/>
+          <a:p>
+            <a:pPr>
+              <a:lnSpc>
+                <a:spcPct val="100000"/>
+              </a:lnSpc>
+            </a:pPr>
+            <a:r>
+              <a:rPr lang="de-DE" dirty="0"/>
+              <a:t>TODO: Baum-Grafik</a:t>
+            </a:r>
+          </a:p>
+          <a:p>
+            <a:pPr>
+              <a:lnSpc>
+                <a:spcPct val="100000"/>
+              </a:lnSpc>
+            </a:pPr>
+            <a:r>
+              <a:rPr lang="de-DE" dirty="0"/>
+              <a:t>„</a:t>
+            </a:r>
+            <a:r>
+              <a:rPr lang="de-DE" dirty="0" err="1"/>
+              <a:t>Generate</a:t>
+            </a:r>
+            <a:r>
+              <a:rPr lang="de-DE" dirty="0"/>
+              <a:t> </a:t>
+            </a:r>
+            <a:r>
+              <a:rPr lang="de-DE" dirty="0" err="1"/>
+              <a:t>and</a:t>
+            </a:r>
+            <a:r>
+              <a:rPr lang="de-DE" dirty="0"/>
+              <a:t> Test“ &amp; Baumaufbau</a:t>
+            </a:r>
+          </a:p>
+          <a:p>
+            <a:pPr>
+              <a:lnSpc>
+                <a:spcPct val="100000"/>
+              </a:lnSpc>
+            </a:pPr>
+            <a:r>
+              <a:rPr lang="de-DE" dirty="0"/>
+              <a:t>Nutzereingabe erschwert Analyse</a:t>
+            </a:r>
+          </a:p>
+          <a:p>
+            <a:pPr>
+              <a:lnSpc>
+                <a:spcPct val="100000"/>
+              </a:lnSpc>
+            </a:pPr>
+            <a:r>
+              <a:rPr lang="de-DE" dirty="0"/>
+              <a:t>Future Work:</a:t>
+            </a:r>
+          </a:p>
+          <a:p>
+            <a:pPr lvl="1">
+              <a:lnSpc>
+                <a:spcPct val="100000"/>
+              </a:lnSpc>
+            </a:pPr>
+            <a:r>
+              <a:rPr lang="de-DE" dirty="0"/>
+              <a:t>Early </a:t>
+            </a:r>
+            <a:r>
+              <a:rPr lang="de-DE" dirty="0" err="1"/>
+              <a:t>Pruning</a:t>
+            </a:r>
+            <a:endParaRPr lang="de-DE" dirty="0"/>
+          </a:p>
+          <a:p>
+            <a:pPr lvl="1">
+              <a:lnSpc>
+                <a:spcPct val="100000"/>
+              </a:lnSpc>
+            </a:pPr>
+            <a:r>
+              <a:rPr lang="de-DE" dirty="0"/>
+              <a:t>Schrittweite</a:t>
+            </a:r>
+          </a:p>
+          <a:p>
+            <a:pPr lvl="1">
+              <a:lnSpc>
+                <a:spcPct val="100000"/>
+              </a:lnSpc>
+            </a:pPr>
+            <a:r>
+              <a:rPr lang="de-DE" dirty="0"/>
+              <a:t>Vorberechnung</a:t>
+            </a:r>
+          </a:p>
+          <a:p>
+            <a:pPr lvl="1">
+              <a:lnSpc>
+                <a:spcPct val="100000"/>
+              </a:lnSpc>
+            </a:pPr>
+            <a:r>
+              <a:rPr lang="de-DE" dirty="0"/>
+              <a:t>Notwendige vs. hinreichende Kriterien</a:t>
+            </a:r>
+          </a:p>
+          <a:p>
+            <a:pPr lvl="1">
+              <a:lnSpc>
+                <a:spcPct val="100000"/>
+              </a:lnSpc>
+            </a:pPr>
+            <a:r>
+              <a:rPr lang="de-DE" dirty="0"/>
+              <a:t>„</a:t>
+            </a:r>
+            <a:r>
+              <a:rPr lang="de-DE" dirty="0" err="1"/>
+              <a:t>Greedy</a:t>
+            </a:r>
+            <a:r>
+              <a:rPr lang="de-DE" dirty="0"/>
+              <a:t>“-Strategie möglich?</a:t>
+            </a:r>
+          </a:p>
+          <a:p>
+            <a:pPr lvl="1">
+              <a:lnSpc>
+                <a:spcPct val="100000"/>
+              </a:lnSpc>
+            </a:pPr>
+            <a:r>
+              <a:rPr lang="de-DE"/>
+              <a:t>Erklärbarkeit</a:t>
+            </a:r>
+            <a:endParaRPr lang="de-DE" dirty="0"/>
+          </a:p>
+          <a:p>
+            <a:pPr lvl="1">
+              <a:lnSpc>
+                <a:spcPct val="100000"/>
+              </a:lnSpc>
+            </a:pPr>
+            <a:endParaRPr lang="de-DE" dirty="0"/>
+          </a:p>
+        </p:txBody>
+      </p:sp>
+      <p:sp>
+        <p:nvSpPr>
           <p:cNvPr id="4" name="Datumsplatzhalter 3">
             <a:extLst>
               <a:ext uri="{FF2B5EF4-FFF2-40B4-BE49-F238E27FC236}">
@@ -4719,8 +4897,8 @@
         </p:nvSpPr>
         <p:spPr>
           <a:xfrm>
-            <a:off x="279993" y="4338424"/>
-            <a:ext cx="3531477" cy="1407920"/>
+            <a:off x="6096000" y="2606566"/>
+            <a:ext cx="11142672" cy="4502318"/>
           </a:xfrm>
           <a:prstGeom prst="rect">
             <a:avLst/>
@@ -4916,7 +5094,7 @@
               </a:lnSpc>
             </a:pPr>
             <a:r>
-              <a:rPr lang="de-DE" sz="2000" dirty="0"/>
+              <a:rPr lang="de-DE" dirty="0"/>
               <a:t>A.1 , A.2 , B ist erlaubt</a:t>
             </a:r>
           </a:p>
@@ -4927,7 +5105,7 @@
               </a:lnSpc>
             </a:pPr>
             <a:r>
-              <a:rPr lang="de-DE" sz="1800" dirty="0"/>
+              <a:rPr lang="de-DE" dirty="0"/>
               <a:t>A.1, B nicht</a:t>
             </a:r>
           </a:p>
@@ -4938,7 +5116,7 @@
               </a:lnSpc>
             </a:pPr>
             <a:r>
-              <a:rPr lang="de-DE" sz="1800" dirty="0"/>
+              <a:rPr lang="de-DE" dirty="0"/>
               <a:t>A.1, A.2, B.1 auch nicht</a:t>
             </a:r>
           </a:p>
@@ -4949,7 +5127,7 @@
               </a:lnSpc>
             </a:pPr>
             <a:r>
-              <a:rPr lang="de-DE" sz="2000" dirty="0"/>
+              <a:rPr lang="de-DE" dirty="0"/>
               <a:t>Knoten ist Multi-Menge</a:t>
             </a:r>
           </a:p>
@@ -4963,12 +5141,133 @@
           </a:p>
         </p:txBody>
       </p:sp>
-      <p:sp>
-        <p:nvSpPr>
-          <p:cNvPr id="11" name="Inhaltsplatzhalter 2">
-            <a:extLst>
-              <a:ext uri="{FF2B5EF4-FFF2-40B4-BE49-F238E27FC236}">
-                <a16:creationId xmlns:a16="http://schemas.microsoft.com/office/drawing/2014/main" id="{5369B94C-4C74-434B-8917-6AB66EF8A3B5}"/>
+    </p:spTree>
+    <p:extLst>
+      <p:ext uri="{BB962C8B-B14F-4D97-AF65-F5344CB8AC3E}">
+        <p14:creationId xmlns:p14="http://schemas.microsoft.com/office/powerpoint/2010/main" val="3528647106"/>
+      </p:ext>
+    </p:extLst>
+  </p:cSld>
+  <p:clrMapOvr>
+    <a:masterClrMapping/>
+  </p:clrMapOvr>
+</p:sld>
+</file>
+
+<file path=ppt/slides/slide11.xml><?xml version="1.0" encoding="utf-8"?>
+<p:sld xmlns:a="http://schemas.openxmlformats.org/drawingml/2006/main" xmlns:r="http://schemas.openxmlformats.org/officeDocument/2006/relationships" xmlns:p="http://schemas.openxmlformats.org/presentationml/2006/main">
+  <p:cSld>
+    <p:spTree>
+      <p:nvGrpSpPr>
+        <p:cNvPr id="1" name=""/>
+        <p:cNvGrpSpPr/>
+        <p:nvPr/>
+      </p:nvGrpSpPr>
+      <p:grpSpPr>
+        <a:xfrm>
+          <a:off x="0" y="0"/>
+          <a:ext cx="0" cy="0"/>
+          <a:chOff x="0" y="0"/>
+          <a:chExt cx="0" cy="0"/>
+        </a:xfrm>
+      </p:grpSpPr>
+      <p:sp>
+        <p:nvSpPr>
+          <p:cNvPr id="2" name="Titel 1">
+            <a:extLst>
+              <a:ext uri="{FF2B5EF4-FFF2-40B4-BE49-F238E27FC236}">
+                <a16:creationId xmlns:a16="http://schemas.microsoft.com/office/drawing/2014/main" id="{4E4AE26E-BDAE-4262-A057-39AC2366A5F1}"/>
+              </a:ext>
+            </a:extLst>
+          </p:cNvPr>
+          <p:cNvSpPr>
+            <a:spLocks noGrp="1"/>
+          </p:cNvSpPr>
+          <p:nvPr>
+            <p:ph type="title"/>
+          </p:nvPr>
+        </p:nvSpPr>
+        <p:spPr>
+          <a:xfrm>
+            <a:off x="524664" y="444005"/>
+            <a:ext cx="9178008" cy="627829"/>
+          </a:xfrm>
+        </p:spPr>
+        <p:txBody>
+          <a:bodyPr/>
+          <a:lstStyle/>
+          <a:p>
+            <a:r>
+              <a:rPr lang="en-US" noProof="0" dirty="0" err="1"/>
+              <a:t>Validierung</a:t>
+            </a:r>
+            <a:endParaRPr lang="en-US" noProof="0" dirty="0"/>
+          </a:p>
+        </p:txBody>
+      </p:sp>
+      <p:sp>
+        <p:nvSpPr>
+          <p:cNvPr id="4" name="Datumsplatzhalter 3">
+            <a:extLst>
+              <a:ext uri="{FF2B5EF4-FFF2-40B4-BE49-F238E27FC236}">
+                <a16:creationId xmlns:a16="http://schemas.microsoft.com/office/drawing/2014/main" id="{9CCAFD67-B02A-4CC5-A0AF-41ECCAE2B82F}"/>
+              </a:ext>
+            </a:extLst>
+          </p:cNvPr>
+          <p:cNvSpPr>
+            <a:spLocks noGrp="1"/>
+          </p:cNvSpPr>
+          <p:nvPr>
+            <p:ph type="dt" sz="half" idx="10"/>
+          </p:nvPr>
+        </p:nvSpPr>
+        <p:spPr/>
+        <p:txBody>
+          <a:bodyPr/>
+          <a:lstStyle/>
+          <a:p>
+            <a:r>
+              <a:rPr lang="de-DE"/>
+              <a:t>25.03.2020</a:t>
+            </a:r>
+          </a:p>
+        </p:txBody>
+      </p:sp>
+      <p:sp>
+        <p:nvSpPr>
+          <p:cNvPr id="6" name="Foliennummernplatzhalter 5">
+            <a:extLst>
+              <a:ext uri="{FF2B5EF4-FFF2-40B4-BE49-F238E27FC236}">
+                <a16:creationId xmlns:a16="http://schemas.microsoft.com/office/drawing/2014/main" id="{2014E5A3-BB19-4CC6-A059-F359A2A51340}"/>
+              </a:ext>
+            </a:extLst>
+          </p:cNvPr>
+          <p:cNvSpPr>
+            <a:spLocks noGrp="1"/>
+          </p:cNvSpPr>
+          <p:nvPr>
+            <p:ph type="sldNum" sz="quarter" idx="12"/>
+          </p:nvPr>
+        </p:nvSpPr>
+        <p:spPr/>
+        <p:txBody>
+          <a:bodyPr/>
+          <a:lstStyle/>
+          <a:p>
+            <a:fld id="{61696EC4-B4CF-4701-AD06-A8439D6D8E12}" type="slidenum">
+              <a:rPr lang="de-DE" smtClean="0"/>
+              <a:t>11</a:t>
+            </a:fld>
+            <a:endParaRPr lang="de-DE"/>
+          </a:p>
+        </p:txBody>
+      </p:sp>
+      <p:sp>
+        <p:nvSpPr>
+          <p:cNvPr id="7" name="Inhaltsplatzhalter 2">
+            <a:extLst>
+              <a:ext uri="{FF2B5EF4-FFF2-40B4-BE49-F238E27FC236}">
+                <a16:creationId xmlns:a16="http://schemas.microsoft.com/office/drawing/2014/main" id="{8AAF696D-35E6-C94A-816B-16AC4067B035}"/>
               </a:ext>
             </a:extLst>
           </p:cNvPr>
@@ -4979,7 +5278,7 @@
         </p:nvSpPr>
         <p:spPr>
           <a:xfrm>
-            <a:off x="3942174" y="4332318"/>
+            <a:off x="279993" y="4338424"/>
             <a:ext cx="3531477" cy="1407920"/>
           </a:xfrm>
           <a:prstGeom prst="rect">
@@ -5177,6 +5476,266 @@
             </a:pPr>
             <a:r>
               <a:rPr lang="de-DE" sz="2000" dirty="0"/>
+              <a:t>A.1 , A.2 , B ist erlaubt</a:t>
+            </a:r>
+          </a:p>
+          <a:p>
+            <a:pPr lvl="1">
+              <a:lnSpc>
+                <a:spcPct val="100000"/>
+              </a:lnSpc>
+            </a:pPr>
+            <a:r>
+              <a:rPr lang="de-DE" sz="1800" dirty="0"/>
+              <a:t>A.1, B nicht</a:t>
+            </a:r>
+          </a:p>
+          <a:p>
+            <a:pPr lvl="1">
+              <a:lnSpc>
+                <a:spcPct val="100000"/>
+              </a:lnSpc>
+            </a:pPr>
+            <a:r>
+              <a:rPr lang="de-DE" sz="1800" dirty="0"/>
+              <a:t>A.1, A.2, B.1 auch nicht</a:t>
+            </a:r>
+          </a:p>
+          <a:p>
+            <a:pPr>
+              <a:lnSpc>
+                <a:spcPct val="100000"/>
+              </a:lnSpc>
+            </a:pPr>
+            <a:r>
+              <a:rPr lang="de-DE" sz="2000" dirty="0"/>
+              <a:t>Knoten ist Multi-Menge</a:t>
+            </a:r>
+          </a:p>
+          <a:p>
+            <a:pPr lvl="1">
+              <a:lnSpc>
+                <a:spcPct val="100000"/>
+              </a:lnSpc>
+            </a:pPr>
+            <a:endParaRPr lang="de-DE" dirty="0"/>
+          </a:p>
+        </p:txBody>
+      </p:sp>
+      <p:sp>
+        <p:nvSpPr>
+          <p:cNvPr id="11" name="Inhaltsplatzhalter 2">
+            <a:extLst>
+              <a:ext uri="{FF2B5EF4-FFF2-40B4-BE49-F238E27FC236}">
+                <a16:creationId xmlns:a16="http://schemas.microsoft.com/office/drawing/2014/main" id="{5369B94C-4C74-434B-8917-6AB66EF8A3B5}"/>
+              </a:ext>
+            </a:extLst>
+          </p:cNvPr>
+          <p:cNvSpPr txBox="1">
+            <a:spLocks/>
+          </p:cNvSpPr>
+          <p:nvPr/>
+        </p:nvSpPr>
+        <p:spPr>
+          <a:xfrm>
+            <a:off x="3942174" y="4332318"/>
+            <a:ext cx="3531477" cy="1407920"/>
+          </a:xfrm>
+          <a:prstGeom prst="rect">
+            <a:avLst/>
+          </a:prstGeom>
+        </p:spPr>
+        <p:txBody>
+          <a:bodyPr vert="horz" lIns="0" tIns="0" rIns="0" bIns="0" rtlCol="0">
+            <a:normAutofit/>
+          </a:bodyPr>
+          <a:lstStyle>
+            <a:lvl1pPr marL="361950" indent="-361950" algn="l" defTabSz="914400" rtl="0" eaLnBrk="1" latinLnBrk="0" hangingPunct="1">
+              <a:lnSpc>
+                <a:spcPct val="90000"/>
+              </a:lnSpc>
+              <a:spcBef>
+                <a:spcPts val="600"/>
+              </a:spcBef>
+              <a:buSzPct val="88000"/>
+              <a:buFontTx/>
+              <a:buBlip>
+                <a:blip r:embed="rId2"/>
+              </a:buBlip>
+              <a:defRPr sz="2800" kern="1200">
+                <a:solidFill>
+                  <a:schemeClr val="tx1"/>
+                </a:solidFill>
+                <a:latin typeface="+mn-lt"/>
+                <a:ea typeface="+mn-ea"/>
+                <a:cs typeface="+mn-cs"/>
+              </a:defRPr>
+            </a:lvl1pPr>
+            <a:lvl2pPr marL="809625" indent="-361950" algn="l" defTabSz="914400" rtl="0" eaLnBrk="1" latinLnBrk="0" hangingPunct="1">
+              <a:lnSpc>
+                <a:spcPct val="90000"/>
+              </a:lnSpc>
+              <a:spcBef>
+                <a:spcPts val="600"/>
+              </a:spcBef>
+              <a:buSzPct val="88000"/>
+              <a:buFontTx/>
+              <a:buBlip>
+                <a:blip r:embed="rId2"/>
+              </a:buBlip>
+              <a:defRPr sz="2400" kern="1200">
+                <a:solidFill>
+                  <a:schemeClr val="tx1"/>
+                </a:solidFill>
+                <a:latin typeface="+mn-lt"/>
+                <a:ea typeface="+mn-ea"/>
+                <a:cs typeface="+mn-cs"/>
+              </a:defRPr>
+            </a:lvl2pPr>
+            <a:lvl3pPr marL="1257300" indent="-361950" algn="l" defTabSz="914400" rtl="0" eaLnBrk="1" latinLnBrk="0" hangingPunct="1">
+              <a:lnSpc>
+                <a:spcPct val="90000"/>
+              </a:lnSpc>
+              <a:spcBef>
+                <a:spcPts val="600"/>
+              </a:spcBef>
+              <a:buSzPct val="88000"/>
+              <a:buFontTx/>
+              <a:buBlip>
+                <a:blip r:embed="rId2"/>
+              </a:buBlip>
+              <a:defRPr sz="2000" kern="1200">
+                <a:solidFill>
+                  <a:schemeClr val="tx1"/>
+                </a:solidFill>
+                <a:latin typeface="+mn-lt"/>
+                <a:ea typeface="+mn-ea"/>
+                <a:cs typeface="+mn-cs"/>
+              </a:defRPr>
+            </a:lvl3pPr>
+            <a:lvl4pPr marL="1704975" indent="-361950" algn="l" defTabSz="914400" rtl="0" eaLnBrk="1" latinLnBrk="0" hangingPunct="1">
+              <a:lnSpc>
+                <a:spcPct val="90000"/>
+              </a:lnSpc>
+              <a:spcBef>
+                <a:spcPts val="600"/>
+              </a:spcBef>
+              <a:buSzPct val="88000"/>
+              <a:buFontTx/>
+              <a:buBlip>
+                <a:blip r:embed="rId2"/>
+              </a:buBlip>
+              <a:defRPr sz="2000" kern="1200">
+                <a:solidFill>
+                  <a:schemeClr val="tx1"/>
+                </a:solidFill>
+                <a:latin typeface="+mn-lt"/>
+                <a:ea typeface="+mn-ea"/>
+                <a:cs typeface="+mn-cs"/>
+              </a:defRPr>
+            </a:lvl4pPr>
+            <a:lvl5pPr marL="2152650" indent="-361950" algn="l" defTabSz="914400" rtl="0" eaLnBrk="1" latinLnBrk="0" hangingPunct="1">
+              <a:lnSpc>
+                <a:spcPct val="90000"/>
+              </a:lnSpc>
+              <a:spcBef>
+                <a:spcPts val="600"/>
+              </a:spcBef>
+              <a:buSzPct val="88000"/>
+              <a:buFontTx/>
+              <a:buBlip>
+                <a:blip r:embed="rId2"/>
+              </a:buBlip>
+              <a:defRPr sz="2000" kern="1200">
+                <a:solidFill>
+                  <a:schemeClr val="tx1"/>
+                </a:solidFill>
+                <a:latin typeface="+mn-lt"/>
+                <a:ea typeface="+mn-ea"/>
+                <a:cs typeface="+mn-cs"/>
+              </a:defRPr>
+            </a:lvl5pPr>
+            <a:lvl6pPr marL="2514600" indent="-228600" algn="l" defTabSz="914400" rtl="0" eaLnBrk="1" latinLnBrk="0" hangingPunct="1">
+              <a:lnSpc>
+                <a:spcPct val="90000"/>
+              </a:lnSpc>
+              <a:spcBef>
+                <a:spcPts val="500"/>
+              </a:spcBef>
+              <a:buFont typeface="Arial" panose="020B0604020202020204" pitchFamily="34" charset="0"/>
+              <a:buChar char="•"/>
+              <a:defRPr sz="1800" kern="1200">
+                <a:solidFill>
+                  <a:schemeClr val="tx1"/>
+                </a:solidFill>
+                <a:latin typeface="+mn-lt"/>
+                <a:ea typeface="+mn-ea"/>
+                <a:cs typeface="+mn-cs"/>
+              </a:defRPr>
+            </a:lvl6pPr>
+            <a:lvl7pPr marL="2971800" indent="-228600" algn="l" defTabSz="914400" rtl="0" eaLnBrk="1" latinLnBrk="0" hangingPunct="1">
+              <a:lnSpc>
+                <a:spcPct val="90000"/>
+              </a:lnSpc>
+              <a:spcBef>
+                <a:spcPts val="500"/>
+              </a:spcBef>
+              <a:buFont typeface="Arial" panose="020B0604020202020204" pitchFamily="34" charset="0"/>
+              <a:buChar char="•"/>
+              <a:defRPr sz="1800" kern="1200">
+                <a:solidFill>
+                  <a:schemeClr val="tx1"/>
+                </a:solidFill>
+                <a:latin typeface="+mn-lt"/>
+                <a:ea typeface="+mn-ea"/>
+                <a:cs typeface="+mn-cs"/>
+              </a:defRPr>
+            </a:lvl7pPr>
+            <a:lvl8pPr marL="3429000" indent="-228600" algn="l" defTabSz="914400" rtl="0" eaLnBrk="1" latinLnBrk="0" hangingPunct="1">
+              <a:lnSpc>
+                <a:spcPct val="90000"/>
+              </a:lnSpc>
+              <a:spcBef>
+                <a:spcPts val="500"/>
+              </a:spcBef>
+              <a:buFont typeface="Arial" panose="020B0604020202020204" pitchFamily="34" charset="0"/>
+              <a:buChar char="•"/>
+              <a:defRPr sz="1800" kern="1200">
+                <a:solidFill>
+                  <a:schemeClr val="tx1"/>
+                </a:solidFill>
+                <a:latin typeface="+mn-lt"/>
+                <a:ea typeface="+mn-ea"/>
+                <a:cs typeface="+mn-cs"/>
+              </a:defRPr>
+            </a:lvl8pPr>
+            <a:lvl9pPr marL="3886200" indent="-228600" algn="l" defTabSz="914400" rtl="0" eaLnBrk="1" latinLnBrk="0" hangingPunct="1">
+              <a:lnSpc>
+                <a:spcPct val="90000"/>
+              </a:lnSpc>
+              <a:spcBef>
+                <a:spcPts val="500"/>
+              </a:spcBef>
+              <a:buFont typeface="Arial" panose="020B0604020202020204" pitchFamily="34" charset="0"/>
+              <a:buChar char="•"/>
+              <a:defRPr sz="1800" kern="1200">
+                <a:solidFill>
+                  <a:schemeClr val="tx1"/>
+                </a:solidFill>
+                <a:latin typeface="+mn-lt"/>
+                <a:ea typeface="+mn-ea"/>
+                <a:cs typeface="+mn-cs"/>
+              </a:defRPr>
+            </a:lvl9pPr>
+          </a:lstStyle>
+          <a:p>
+            <a:pPr>
+              <a:lnSpc>
+                <a:spcPct val="100000"/>
+              </a:lnSpc>
+            </a:pPr>
+            <a:r>
+              <a:rPr lang="de-DE" sz="2000" dirty="0"/>
               <a:t>„Ausnahmen“ generieren alle Kandidaten</a:t>
             </a:r>
           </a:p>
@@ -5246,161 +5805,6 @@
 </p:sld>
 </file>
 
-<file path=ppt/slides/slide11.xml><?xml version="1.0" encoding="utf-8"?>
-<p:sld xmlns:a="http://schemas.openxmlformats.org/drawingml/2006/main" xmlns:r="http://schemas.openxmlformats.org/officeDocument/2006/relationships" xmlns:p="http://schemas.openxmlformats.org/presentationml/2006/main">
-  <p:cSld>
-    <p:spTree>
-      <p:nvGrpSpPr>
-        <p:cNvPr id="1" name=""/>
-        <p:cNvGrpSpPr/>
-        <p:nvPr/>
-      </p:nvGrpSpPr>
-      <p:grpSpPr>
-        <a:xfrm>
-          <a:off x="0" y="0"/>
-          <a:ext cx="0" cy="0"/>
-          <a:chOff x="0" y="0"/>
-          <a:chExt cx="0" cy="0"/>
-        </a:xfrm>
-      </p:grpSpPr>
-      <p:sp>
-        <p:nvSpPr>
-          <p:cNvPr id="2" name="Titel 1">
-            <a:extLst>
-              <a:ext uri="{FF2B5EF4-FFF2-40B4-BE49-F238E27FC236}">
-                <a16:creationId xmlns:a16="http://schemas.microsoft.com/office/drawing/2014/main" id="{4E4AE26E-BDAE-4262-A057-39AC2366A5F1}"/>
-              </a:ext>
-            </a:extLst>
-          </p:cNvPr>
-          <p:cNvSpPr>
-            <a:spLocks noGrp="1"/>
-          </p:cNvSpPr>
-          <p:nvPr>
-            <p:ph type="title"/>
-          </p:nvPr>
-        </p:nvSpPr>
-        <p:spPr>
-          <a:xfrm>
-            <a:off x="524664" y="444005"/>
-            <a:ext cx="9178008" cy="627829"/>
-          </a:xfrm>
-        </p:spPr>
-        <p:txBody>
-          <a:bodyPr/>
-          <a:lstStyle/>
-          <a:p>
-            <a:r>
-              <a:rPr lang="en-US" noProof="0" dirty="0"/>
-              <a:t>Demo</a:t>
-            </a:r>
-          </a:p>
-        </p:txBody>
-      </p:sp>
-      <p:sp>
-        <p:nvSpPr>
-          <p:cNvPr id="3" name="Inhaltsplatzhalter 2">
-            <a:extLst>
-              <a:ext uri="{FF2B5EF4-FFF2-40B4-BE49-F238E27FC236}">
-                <a16:creationId xmlns:a16="http://schemas.microsoft.com/office/drawing/2014/main" id="{900E3307-8428-4C7A-A1DA-C96FE547A036}"/>
-              </a:ext>
-            </a:extLst>
-          </p:cNvPr>
-          <p:cNvSpPr>
-            <a:spLocks noGrp="1"/>
-          </p:cNvSpPr>
-          <p:nvPr>
-            <p:ph idx="1"/>
-          </p:nvPr>
-        </p:nvSpPr>
-        <p:spPr>
-          <a:xfrm>
-            <a:off x="524664" y="1269207"/>
-            <a:ext cx="11142672" cy="4502318"/>
-          </a:xfrm>
-        </p:spPr>
-        <p:txBody>
-          <a:bodyPr/>
-          <a:lstStyle/>
-          <a:p>
-            <a:pPr>
-              <a:lnSpc>
-                <a:spcPct val="100000"/>
-              </a:lnSpc>
-            </a:pPr>
-            <a:endParaRPr lang="de-DE" dirty="0"/>
-          </a:p>
-        </p:txBody>
-      </p:sp>
-      <p:sp>
-        <p:nvSpPr>
-          <p:cNvPr id="4" name="Datumsplatzhalter 3">
-            <a:extLst>
-              <a:ext uri="{FF2B5EF4-FFF2-40B4-BE49-F238E27FC236}">
-                <a16:creationId xmlns:a16="http://schemas.microsoft.com/office/drawing/2014/main" id="{9CCAFD67-B02A-4CC5-A0AF-41ECCAE2B82F}"/>
-              </a:ext>
-            </a:extLst>
-          </p:cNvPr>
-          <p:cNvSpPr>
-            <a:spLocks noGrp="1"/>
-          </p:cNvSpPr>
-          <p:nvPr>
-            <p:ph type="dt" sz="half" idx="10"/>
-          </p:nvPr>
-        </p:nvSpPr>
-        <p:spPr/>
-        <p:txBody>
-          <a:bodyPr/>
-          <a:lstStyle/>
-          <a:p>
-            <a:r>
-              <a:rPr lang="de-DE"/>
-              <a:t>25.03.2020</a:t>
-            </a:r>
-          </a:p>
-        </p:txBody>
-      </p:sp>
-      <p:sp>
-        <p:nvSpPr>
-          <p:cNvPr id="6" name="Foliennummernplatzhalter 5">
-            <a:extLst>
-              <a:ext uri="{FF2B5EF4-FFF2-40B4-BE49-F238E27FC236}">
-                <a16:creationId xmlns:a16="http://schemas.microsoft.com/office/drawing/2014/main" id="{2014E5A3-BB19-4CC6-A059-F359A2A51340}"/>
-              </a:ext>
-            </a:extLst>
-          </p:cNvPr>
-          <p:cNvSpPr>
-            <a:spLocks noGrp="1"/>
-          </p:cNvSpPr>
-          <p:nvPr>
-            <p:ph type="sldNum" sz="quarter" idx="12"/>
-          </p:nvPr>
-        </p:nvSpPr>
-        <p:spPr/>
-        <p:txBody>
-          <a:bodyPr/>
-          <a:lstStyle/>
-          <a:p>
-            <a:fld id="{61696EC4-B4CF-4701-AD06-A8439D6D8E12}" type="slidenum">
-              <a:rPr lang="de-DE" smtClean="0"/>
-              <a:t>11</a:t>
-            </a:fld>
-            <a:endParaRPr lang="de-DE"/>
-          </a:p>
-        </p:txBody>
-      </p:sp>
-    </p:spTree>
-    <p:extLst>
-      <p:ext uri="{BB962C8B-B14F-4D97-AF65-F5344CB8AC3E}">
-        <p14:creationId xmlns:p14="http://schemas.microsoft.com/office/powerpoint/2010/main" val="1866389151"/>
-      </p:ext>
-    </p:extLst>
-  </p:cSld>
-  <p:clrMapOvr>
-    <a:masterClrMapping/>
-  </p:clrMapOvr>
-</p:sld>
-</file>
-
 <file path=ppt/slides/slide12.xml><?xml version="1.0" encoding="utf-8"?>
 <p:sld xmlns:a="http://schemas.openxmlformats.org/drawingml/2006/main" xmlns:r="http://schemas.openxmlformats.org/officeDocument/2006/relationships" xmlns:p="http://schemas.openxmlformats.org/presentationml/2006/main">
   <p:cSld>
@@ -5446,46 +5850,46 @@
           <a:p>
             <a:r>
               <a:rPr lang="en-US" noProof="0" dirty="0"/>
-              <a:t>Meta-Modell (1)</a:t>
-            </a:r>
-          </a:p>
-        </p:txBody>
-      </p:sp>
-      <p:pic>
-        <p:nvPicPr>
-          <p:cNvPr id="7" name="Inhaltsplatzhalter 6">
-            <a:extLst>
-              <a:ext uri="{FF2B5EF4-FFF2-40B4-BE49-F238E27FC236}">
-                <a16:creationId xmlns:a16="http://schemas.microsoft.com/office/drawing/2014/main" id="{AAFBDB75-4142-7142-926F-5BA01FB0FEA5}"/>
-              </a:ext>
-            </a:extLst>
-          </p:cNvPr>
-          <p:cNvPicPr>
-            <a:picLocks noGrp="1" noChangeAspect="1"/>
-          </p:cNvPicPr>
+              <a:t>Demo</a:t>
+            </a:r>
+          </a:p>
+        </p:txBody>
+      </p:sp>
+      <p:sp>
+        <p:nvSpPr>
+          <p:cNvPr id="3" name="Inhaltsplatzhalter 2">
+            <a:extLst>
+              <a:ext uri="{FF2B5EF4-FFF2-40B4-BE49-F238E27FC236}">
+                <a16:creationId xmlns:a16="http://schemas.microsoft.com/office/drawing/2014/main" id="{900E3307-8428-4C7A-A1DA-C96FE547A036}"/>
+              </a:ext>
+            </a:extLst>
+          </p:cNvPr>
+          <p:cNvSpPr>
+            <a:spLocks noGrp="1"/>
+          </p:cNvSpPr>
           <p:nvPr>
             <p:ph idx="1"/>
           </p:nvPr>
-        </p:nvPicPr>
-        <p:blipFill>
-          <a:blip r:embed="rId2">
-            <a:extLst>
-              <a:ext uri="{28A0092B-C50C-407E-A947-70E740481C1C}">
-                <a14:useLocalDpi xmlns:a14="http://schemas.microsoft.com/office/drawing/2010/main" val="0"/>
-              </a:ext>
-            </a:extLst>
-          </a:blip>
-          <a:stretch>
-            <a:fillRect/>
-          </a:stretch>
-        </p:blipFill>
+        </p:nvSpPr>
         <p:spPr>
           <a:xfrm>
-            <a:off x="2899213" y="1261021"/>
-            <a:ext cx="5330387" cy="1819354"/>
+            <a:off x="524664" y="1269207"/>
+            <a:ext cx="11142672" cy="4502318"/>
           </a:xfrm>
         </p:spPr>
-      </p:pic>
+        <p:txBody>
+          <a:bodyPr/>
+          <a:lstStyle/>
+          <a:p>
+            <a:pPr>
+              <a:lnSpc>
+                <a:spcPct val="100000"/>
+              </a:lnSpc>
+            </a:pPr>
+            <a:endParaRPr lang="de-DE" dirty="0"/>
+          </a:p>
+        </p:txBody>
+      </p:sp>
       <p:sp>
         <p:nvSpPr>
           <p:cNvPr id="4" name="Datumsplatzhalter 3">
@@ -5546,7 +5950,7 @@
     </p:spTree>
     <p:extLst>
       <p:ext uri="{BB962C8B-B14F-4D97-AF65-F5344CB8AC3E}">
-        <p14:creationId xmlns:p14="http://schemas.microsoft.com/office/powerpoint/2010/main" val="2669224639"/>
+        <p14:creationId xmlns:p14="http://schemas.microsoft.com/office/powerpoint/2010/main" val="1866389151"/>
       </p:ext>
     </p:extLst>
   </p:cSld>
@@ -5601,7 +6005,7 @@
           <a:p>
             <a:r>
               <a:rPr lang="en-US" noProof="0" dirty="0"/>
-              <a:t>Meta-Modell (2)</a:t>
+              <a:t>Meta-Modell (1)</a:t>
             </a:r>
           </a:p>
         </p:txBody>
@@ -5611,7 +6015,7 @@
           <p:cNvPr id="7" name="Inhaltsplatzhalter 6">
             <a:extLst>
               <a:ext uri="{FF2B5EF4-FFF2-40B4-BE49-F238E27FC236}">
-                <a16:creationId xmlns:a16="http://schemas.microsoft.com/office/drawing/2014/main" id="{84EBC7FC-1EE8-0648-884C-272B49BEAE15}"/>
+                <a16:creationId xmlns:a16="http://schemas.microsoft.com/office/drawing/2014/main" id="{AAFBDB75-4142-7142-926F-5BA01FB0FEA5}"/>
               </a:ext>
             </a:extLst>
           </p:cNvPr>
@@ -5636,8 +6040,8 @@
         </p:blipFill>
         <p:spPr>
           <a:xfrm>
-            <a:off x="2899592" y="1270000"/>
-            <a:ext cx="6392816" cy="4502150"/>
+            <a:off x="2899213" y="1261021"/>
+            <a:ext cx="5330387" cy="1819354"/>
           </a:xfrm>
         </p:spPr>
       </p:pic>
@@ -5701,7 +6105,7 @@
     </p:spTree>
     <p:extLst>
       <p:ext uri="{BB962C8B-B14F-4D97-AF65-F5344CB8AC3E}">
-        <p14:creationId xmlns:p14="http://schemas.microsoft.com/office/powerpoint/2010/main" val="457514926"/>
+        <p14:creationId xmlns:p14="http://schemas.microsoft.com/office/powerpoint/2010/main" val="2669224639"/>
       </p:ext>
     </p:extLst>
   </p:cSld>
@@ -5756,7 +6160,7 @@
           <a:p>
             <a:r>
               <a:rPr lang="en-US" noProof="0" dirty="0"/>
-              <a:t>Meta-Modell (3)</a:t>
+              <a:t>Meta-Modell (2)</a:t>
             </a:r>
           </a:p>
         </p:txBody>
@@ -5766,7 +6170,7 @@
           <p:cNvPr id="7" name="Inhaltsplatzhalter 6">
             <a:extLst>
               <a:ext uri="{FF2B5EF4-FFF2-40B4-BE49-F238E27FC236}">
-                <a16:creationId xmlns:a16="http://schemas.microsoft.com/office/drawing/2014/main" id="{597271BE-975A-8448-8890-95AC9CA9A263}"/>
+                <a16:creationId xmlns:a16="http://schemas.microsoft.com/office/drawing/2014/main" id="{84EBC7FC-1EE8-0648-884C-272B49BEAE15}"/>
               </a:ext>
             </a:extLst>
           </p:cNvPr>
@@ -5791,8 +6195,8 @@
         </p:blipFill>
         <p:spPr>
           <a:xfrm>
-            <a:off x="3615691" y="1270000"/>
-            <a:ext cx="4960617" cy="4502150"/>
+            <a:off x="2899592" y="1270000"/>
+            <a:ext cx="6392816" cy="4502150"/>
           </a:xfrm>
         </p:spPr>
       </p:pic>
@@ -5856,7 +6260,7 @@
     </p:spTree>
     <p:extLst>
       <p:ext uri="{BB962C8B-B14F-4D97-AF65-F5344CB8AC3E}">
-        <p14:creationId xmlns:p14="http://schemas.microsoft.com/office/powerpoint/2010/main" val="1840141399"/>
+        <p14:creationId xmlns:p14="http://schemas.microsoft.com/office/powerpoint/2010/main" val="457514926"/>
       </p:ext>
     </p:extLst>
   </p:cSld>
@@ -5911,17 +6315,17 @@
           <a:p>
             <a:r>
               <a:rPr lang="en-US" noProof="0" dirty="0"/>
-              <a:t>Meta-Modell (4)</a:t>
+              <a:t>Meta-Modell (3)</a:t>
             </a:r>
           </a:p>
         </p:txBody>
       </p:sp>
       <p:pic>
         <p:nvPicPr>
-          <p:cNvPr id="7" name="Inhaltsplatzhalter 6" descr="Ein Bild, das Screenshot enthält.&#10;&#10;Automatisch generierte Beschreibung">
-            <a:extLst>
-              <a:ext uri="{FF2B5EF4-FFF2-40B4-BE49-F238E27FC236}">
-                <a16:creationId xmlns:a16="http://schemas.microsoft.com/office/drawing/2014/main" id="{69BFE89E-4FB3-B845-BE66-7A1F3B0E16C1}"/>
+          <p:cNvPr id="7" name="Inhaltsplatzhalter 6">
+            <a:extLst>
+              <a:ext uri="{FF2B5EF4-FFF2-40B4-BE49-F238E27FC236}">
+                <a16:creationId xmlns:a16="http://schemas.microsoft.com/office/drawing/2014/main" id="{597271BE-975A-8448-8890-95AC9CA9A263}"/>
               </a:ext>
             </a:extLst>
           </p:cNvPr>
@@ -5946,8 +6350,8 @@
         </p:blipFill>
         <p:spPr>
           <a:xfrm>
-            <a:off x="3236526" y="1270000"/>
-            <a:ext cx="5718947" cy="4502150"/>
+            <a:off x="3615691" y="1270000"/>
+            <a:ext cx="4960617" cy="4502150"/>
           </a:xfrm>
         </p:spPr>
       </p:pic>
@@ -6011,7 +6415,7 @@
     </p:spTree>
     <p:extLst>
       <p:ext uri="{BB962C8B-B14F-4D97-AF65-F5344CB8AC3E}">
-        <p14:creationId xmlns:p14="http://schemas.microsoft.com/office/powerpoint/2010/main" val="2735828084"/>
+        <p14:creationId xmlns:p14="http://schemas.microsoft.com/office/powerpoint/2010/main" val="1840141399"/>
       </p:ext>
     </p:extLst>
   </p:cSld>
@@ -6066,7 +6470,7 @@
           <a:p>
             <a:r>
               <a:rPr lang="en-US" noProof="0" dirty="0"/>
-              <a:t>Meta-Modell (5)</a:t>
+              <a:t>Meta-Modell (4)</a:t>
             </a:r>
           </a:p>
         </p:txBody>
@@ -6076,7 +6480,7 @@
           <p:cNvPr id="7" name="Inhaltsplatzhalter 6" descr="Ein Bild, das Screenshot enthält.&#10;&#10;Automatisch generierte Beschreibung">
             <a:extLst>
               <a:ext uri="{FF2B5EF4-FFF2-40B4-BE49-F238E27FC236}">
-                <a16:creationId xmlns:a16="http://schemas.microsoft.com/office/drawing/2014/main" id="{62C7D3AB-7537-E546-BC76-8768A15A3C62}"/>
+                <a16:creationId xmlns:a16="http://schemas.microsoft.com/office/drawing/2014/main" id="{69BFE89E-4FB3-B845-BE66-7A1F3B0E16C1}"/>
               </a:ext>
             </a:extLst>
           </p:cNvPr>
@@ -6101,8 +6505,8 @@
         </p:blipFill>
         <p:spPr>
           <a:xfrm>
-            <a:off x="3149612" y="1270000"/>
-            <a:ext cx="5892775" cy="4502150"/>
+            <a:off x="3236526" y="1270000"/>
+            <a:ext cx="5718947" cy="4502150"/>
           </a:xfrm>
         </p:spPr>
       </p:pic>
@@ -6166,7 +6570,7 @@
     </p:spTree>
     <p:extLst>
       <p:ext uri="{BB962C8B-B14F-4D97-AF65-F5344CB8AC3E}">
-        <p14:creationId xmlns:p14="http://schemas.microsoft.com/office/powerpoint/2010/main" val="1226132527"/>
+        <p14:creationId xmlns:p14="http://schemas.microsoft.com/office/powerpoint/2010/main" val="2735828084"/>
       </p:ext>
     </p:extLst>
   </p:cSld>
@@ -6220,6 +6624,161 @@
           <a:lstStyle/>
           <a:p>
             <a:r>
+              <a:rPr lang="en-US" noProof="0" dirty="0"/>
+              <a:t>Meta-Modell (5)</a:t>
+            </a:r>
+          </a:p>
+        </p:txBody>
+      </p:sp>
+      <p:pic>
+        <p:nvPicPr>
+          <p:cNvPr id="7" name="Inhaltsplatzhalter 6" descr="Ein Bild, das Screenshot enthält.&#10;&#10;Automatisch generierte Beschreibung">
+            <a:extLst>
+              <a:ext uri="{FF2B5EF4-FFF2-40B4-BE49-F238E27FC236}">
+                <a16:creationId xmlns:a16="http://schemas.microsoft.com/office/drawing/2014/main" id="{62C7D3AB-7537-E546-BC76-8768A15A3C62}"/>
+              </a:ext>
+            </a:extLst>
+          </p:cNvPr>
+          <p:cNvPicPr>
+            <a:picLocks noGrp="1" noChangeAspect="1"/>
+          </p:cNvPicPr>
+          <p:nvPr>
+            <p:ph idx="1"/>
+          </p:nvPr>
+        </p:nvPicPr>
+        <p:blipFill>
+          <a:blip r:embed="rId2">
+            <a:extLst>
+              <a:ext uri="{28A0092B-C50C-407E-A947-70E740481C1C}">
+                <a14:useLocalDpi xmlns:a14="http://schemas.microsoft.com/office/drawing/2010/main" val="0"/>
+              </a:ext>
+            </a:extLst>
+          </a:blip>
+          <a:stretch>
+            <a:fillRect/>
+          </a:stretch>
+        </p:blipFill>
+        <p:spPr>
+          <a:xfrm>
+            <a:off x="3149612" y="1270000"/>
+            <a:ext cx="5892775" cy="4502150"/>
+          </a:xfrm>
+        </p:spPr>
+      </p:pic>
+      <p:sp>
+        <p:nvSpPr>
+          <p:cNvPr id="4" name="Datumsplatzhalter 3">
+            <a:extLst>
+              <a:ext uri="{FF2B5EF4-FFF2-40B4-BE49-F238E27FC236}">
+                <a16:creationId xmlns:a16="http://schemas.microsoft.com/office/drawing/2014/main" id="{9CCAFD67-B02A-4CC5-A0AF-41ECCAE2B82F}"/>
+              </a:ext>
+            </a:extLst>
+          </p:cNvPr>
+          <p:cNvSpPr>
+            <a:spLocks noGrp="1"/>
+          </p:cNvSpPr>
+          <p:nvPr>
+            <p:ph type="dt" sz="half" idx="10"/>
+          </p:nvPr>
+        </p:nvSpPr>
+        <p:spPr/>
+        <p:txBody>
+          <a:bodyPr/>
+          <a:lstStyle/>
+          <a:p>
+            <a:r>
+              <a:rPr lang="de-DE"/>
+              <a:t>25.03.2020</a:t>
+            </a:r>
+          </a:p>
+        </p:txBody>
+      </p:sp>
+      <p:sp>
+        <p:nvSpPr>
+          <p:cNvPr id="6" name="Foliennummernplatzhalter 5">
+            <a:extLst>
+              <a:ext uri="{FF2B5EF4-FFF2-40B4-BE49-F238E27FC236}">
+                <a16:creationId xmlns:a16="http://schemas.microsoft.com/office/drawing/2014/main" id="{2014E5A3-BB19-4CC6-A059-F359A2A51340}"/>
+              </a:ext>
+            </a:extLst>
+          </p:cNvPr>
+          <p:cNvSpPr>
+            <a:spLocks noGrp="1"/>
+          </p:cNvSpPr>
+          <p:nvPr>
+            <p:ph type="sldNum" sz="quarter" idx="12"/>
+          </p:nvPr>
+        </p:nvSpPr>
+        <p:spPr/>
+        <p:txBody>
+          <a:bodyPr/>
+          <a:lstStyle/>
+          <a:p>
+            <a:fld id="{61696EC4-B4CF-4701-AD06-A8439D6D8E12}" type="slidenum">
+              <a:rPr lang="de-DE" smtClean="0"/>
+              <a:t>17</a:t>
+            </a:fld>
+            <a:endParaRPr lang="de-DE"/>
+          </a:p>
+        </p:txBody>
+      </p:sp>
+    </p:spTree>
+    <p:extLst>
+      <p:ext uri="{BB962C8B-B14F-4D97-AF65-F5344CB8AC3E}">
+        <p14:creationId xmlns:p14="http://schemas.microsoft.com/office/powerpoint/2010/main" val="1226132527"/>
+      </p:ext>
+    </p:extLst>
+  </p:cSld>
+  <p:clrMapOvr>
+    <a:masterClrMapping/>
+  </p:clrMapOvr>
+</p:sld>
+</file>
+
+<file path=ppt/slides/slide18.xml><?xml version="1.0" encoding="utf-8"?>
+<p:sld xmlns:a="http://schemas.openxmlformats.org/drawingml/2006/main" xmlns:r="http://schemas.openxmlformats.org/officeDocument/2006/relationships" xmlns:p="http://schemas.openxmlformats.org/presentationml/2006/main">
+  <p:cSld>
+    <p:spTree>
+      <p:nvGrpSpPr>
+        <p:cNvPr id="1" name=""/>
+        <p:cNvGrpSpPr/>
+        <p:nvPr/>
+      </p:nvGrpSpPr>
+      <p:grpSpPr>
+        <a:xfrm>
+          <a:off x="0" y="0"/>
+          <a:ext cx="0" cy="0"/>
+          <a:chOff x="0" y="0"/>
+          <a:chExt cx="0" cy="0"/>
+        </a:xfrm>
+      </p:grpSpPr>
+      <p:sp>
+        <p:nvSpPr>
+          <p:cNvPr id="2" name="Titel 1">
+            <a:extLst>
+              <a:ext uri="{FF2B5EF4-FFF2-40B4-BE49-F238E27FC236}">
+                <a16:creationId xmlns:a16="http://schemas.microsoft.com/office/drawing/2014/main" id="{4E4AE26E-BDAE-4262-A057-39AC2366A5F1}"/>
+              </a:ext>
+            </a:extLst>
+          </p:cNvPr>
+          <p:cNvSpPr>
+            <a:spLocks noGrp="1"/>
+          </p:cNvSpPr>
+          <p:nvPr>
+            <p:ph type="title"/>
+          </p:nvPr>
+        </p:nvSpPr>
+        <p:spPr>
+          <a:xfrm>
+            <a:off x="524664" y="444005"/>
+            <a:ext cx="9178008" cy="627829"/>
+          </a:xfrm>
+        </p:spPr>
+        <p:txBody>
+          <a:bodyPr/>
+          <a:lstStyle/>
+          <a:p>
+            <a:r>
               <a:rPr lang="en-US" noProof="0" dirty="0" err="1"/>
               <a:t>Zusammenfassung</a:t>
             </a:r>
@@ -6313,7 +6872,7 @@
           <a:p>
             <a:fld id="{61696EC4-B4CF-4701-AD06-A8439D6D8E12}" type="slidenum">
               <a:rPr lang="de-DE" smtClean="0"/>
-              <a:t>17</a:t>
+              <a:t>18</a:t>
             </a:fld>
             <a:endParaRPr lang="de-DE"/>
           </a:p>
@@ -8748,10 +9307,17 @@
           <a:lstStyle/>
           <a:p>
             <a:r>
-              <a:rPr lang="en-US" noProof="0" dirty="0" err="1"/>
-              <a:t>Validierung</a:t>
-            </a:r>
-            <a:endParaRPr lang="en-US" noProof="0" dirty="0"/>
+              <a:rPr lang="en-US" noProof="0" dirty="0"/>
+              <a:t>Eclipse -</a:t>
+            </a:r>
+            <a:r>
+              <a:rPr lang="en-US" dirty="0"/>
+              <a:t> </a:t>
+            </a:r>
+            <a:r>
+              <a:rPr lang="en-US" noProof="0" dirty="0"/>
+              <a:t>Sirius</a:t>
+            </a:r>
           </a:p>
         </p:txBody>
       </p:sp>
@@ -8788,7 +9354,18 @@
             </a:pPr>
             <a:r>
               <a:rPr lang="de-DE" dirty="0"/>
-              <a:t>TODO: Baum-Grafik</a:t>
+              <a:t>Framework für Erstellung von Editoren</a:t>
+            </a:r>
+          </a:p>
+          <a:p>
+            <a:pPr lvl="1">
+              <a:lnSpc>
+                <a:spcPct val="100000"/>
+              </a:lnSpc>
+            </a:pPr>
+            <a:r>
+              <a:rPr lang="de-DE" dirty="0"/>
+              <a:t>Auf Basis von Meta-Modellen</a:t>
             </a:r>
           </a:p>
           <a:p>
@@ -8799,23 +9376,7 @@
             </a:pPr>
             <a:r>
               <a:rPr lang="de-DE" dirty="0"/>
-              <a:t>„</a:t>
-            </a:r>
-            <a:r>
-              <a:rPr lang="de-DE" dirty="0" err="1"/>
-              <a:t>Generate</a:t>
-            </a:r>
-            <a:r>
-              <a:rPr lang="de-DE" dirty="0"/>
-              <a:t> </a:t>
-            </a:r>
-            <a:r>
-              <a:rPr lang="de-DE" dirty="0" err="1"/>
-              <a:t>and</a:t>
-            </a:r>
-            <a:r>
-              <a:rPr lang="de-DE" dirty="0"/>
-              <a:t> Test“ &amp; Baumaufbau</a:t>
+              <a:t>...</a:t>
             </a:r>
           </a:p>
           <a:p>
@@ -8826,18 +9387,7 @@
             </a:pPr>
             <a:r>
               <a:rPr lang="de-DE" dirty="0"/>
-              <a:t>Nutzereingabe erschwert Analyse</a:t>
-            </a:r>
-          </a:p>
-          <a:p>
-            <a:pPr>
-              <a:lnSpc>
-                <a:spcPct val="100000"/>
-              </a:lnSpc>
-            </a:pPr>
-            <a:r>
-              <a:rPr lang="de-DE" dirty="0"/>
-              <a:t>Future Work:</a:t>
+              <a:t>Logische Trennung von </a:t>
             </a:r>
           </a:p>
           <a:p>
@@ -8848,13 +9398,8 @@
             </a:pPr>
             <a:r>
               <a:rPr lang="de-DE" dirty="0"/>
-              <a:t>Early </a:t>
-            </a:r>
-            <a:r>
-              <a:rPr lang="de-DE" dirty="0" err="1"/>
-              <a:t>Pruning</a:t>
-            </a:r>
-            <a:endParaRPr lang="de-DE" dirty="0"/>
+              <a:t>Modell </a:t>
+            </a:r>
           </a:p>
           <a:p>
             <a:pPr lvl="1">
@@ -8864,7 +9409,7 @@
             </a:pPr>
             <a:r>
               <a:rPr lang="de-DE" dirty="0"/>
-              <a:t>Schrittweite</a:t>
+              <a:t>Repräsentation</a:t>
             </a:r>
           </a:p>
           <a:p>
@@ -8875,46 +9420,8 @@
             </a:pPr>
             <a:r>
               <a:rPr lang="de-DE" dirty="0"/>
-              <a:t>Vorberechnung</a:t>
-            </a:r>
-          </a:p>
-          <a:p>
-            <a:pPr lvl="1">
-              <a:lnSpc>
-                <a:spcPct val="100000"/>
-              </a:lnSpc>
-            </a:pPr>
-            <a:r>
-              <a:rPr lang="de-DE" dirty="0"/>
-              <a:t>Notwendige vs. hinreichende Kriterien</a:t>
-            </a:r>
-          </a:p>
-          <a:p>
-            <a:pPr lvl="1">
-              <a:lnSpc>
-                <a:spcPct val="100000"/>
-              </a:lnSpc>
-            </a:pPr>
-            <a:r>
-              <a:rPr lang="de-DE" dirty="0"/>
-              <a:t>„</a:t>
-            </a:r>
-            <a:r>
-              <a:rPr lang="de-DE" dirty="0" err="1"/>
-              <a:t>Greedy</a:t>
-            </a:r>
-            <a:r>
-              <a:rPr lang="de-DE" dirty="0"/>
-              <a:t>“-Strategie möglich?</a:t>
-            </a:r>
-          </a:p>
-          <a:p>
-            <a:pPr lvl="1">
-              <a:lnSpc>
-                <a:spcPct val="100000"/>
-              </a:lnSpc>
-            </a:pPr>
-            <a:endParaRPr lang="de-DE" dirty="0"/>
+              <a:t>Editor</a:t>
+            </a:r>
           </a:p>
         </p:txBody>
       </p:sp>
@@ -8975,270 +9482,250 @@
           </a:p>
         </p:txBody>
       </p:sp>
-      <p:sp>
-        <p:nvSpPr>
-          <p:cNvPr id="7" name="Inhaltsplatzhalter 2">
-            <a:extLst>
-              <a:ext uri="{FF2B5EF4-FFF2-40B4-BE49-F238E27FC236}">
-                <a16:creationId xmlns:a16="http://schemas.microsoft.com/office/drawing/2014/main" id="{8AAF696D-35E6-C94A-816B-16AC4067B035}"/>
-              </a:ext>
-            </a:extLst>
-          </p:cNvPr>
-          <p:cNvSpPr txBox="1">
-            <a:spLocks/>
-          </p:cNvSpPr>
+      <p:grpSp>
+        <p:nvGrpSpPr>
+          <p:cNvPr id="15" name="Gruppieren 14">
+            <a:extLst>
+              <a:ext uri="{FF2B5EF4-FFF2-40B4-BE49-F238E27FC236}">
+                <a16:creationId xmlns:a16="http://schemas.microsoft.com/office/drawing/2014/main" id="{51DCBB4E-CCC1-6B4D-BCEA-0F137673D4D3}"/>
+              </a:ext>
+            </a:extLst>
+          </p:cNvPr>
+          <p:cNvGrpSpPr/>
           <p:nvPr/>
-        </p:nvSpPr>
-        <p:spPr>
+        </p:nvGrpSpPr>
+        <p:grpSpPr>
           <a:xfrm>
-            <a:off x="6096000" y="2606566"/>
-            <a:ext cx="11142672" cy="4502318"/>
+            <a:off x="6376058" y="3148695"/>
+            <a:ext cx="5011371" cy="2963365"/>
+            <a:chOff x="3706431" y="3220347"/>
+            <a:chExt cx="5011371" cy="2963365"/>
           </a:xfrm>
-          <a:prstGeom prst="rect">
-            <a:avLst/>
-          </a:prstGeom>
-        </p:spPr>
-        <p:txBody>
-          <a:bodyPr vert="horz" lIns="0" tIns="0" rIns="0" bIns="0" rtlCol="0">
-            <a:normAutofit/>
-          </a:bodyPr>
-          <a:lstStyle>
-            <a:lvl1pPr marL="361950" indent="-361950" algn="l" defTabSz="914400" rtl="0" eaLnBrk="1" latinLnBrk="0" hangingPunct="1">
-              <a:lnSpc>
-                <a:spcPct val="90000"/>
-              </a:lnSpc>
-              <a:spcBef>
-                <a:spcPts val="600"/>
-              </a:spcBef>
-              <a:buSzPct val="88000"/>
-              <a:buFontTx/>
-              <a:buBlip>
-                <a:blip r:embed="rId2"/>
-              </a:buBlip>
-              <a:defRPr sz="2800" kern="1200">
-                <a:solidFill>
-                  <a:schemeClr val="tx1"/>
-                </a:solidFill>
-                <a:latin typeface="+mn-lt"/>
-                <a:ea typeface="+mn-ea"/>
-                <a:cs typeface="+mn-cs"/>
-              </a:defRPr>
-            </a:lvl1pPr>
-            <a:lvl2pPr marL="809625" indent="-361950" algn="l" defTabSz="914400" rtl="0" eaLnBrk="1" latinLnBrk="0" hangingPunct="1">
-              <a:lnSpc>
-                <a:spcPct val="90000"/>
-              </a:lnSpc>
-              <a:spcBef>
-                <a:spcPts val="600"/>
-              </a:spcBef>
-              <a:buSzPct val="88000"/>
-              <a:buFontTx/>
-              <a:buBlip>
-                <a:blip r:embed="rId2"/>
-              </a:buBlip>
-              <a:defRPr sz="2400" kern="1200">
-                <a:solidFill>
-                  <a:schemeClr val="tx1"/>
-                </a:solidFill>
-                <a:latin typeface="+mn-lt"/>
-                <a:ea typeface="+mn-ea"/>
-                <a:cs typeface="+mn-cs"/>
-              </a:defRPr>
-            </a:lvl2pPr>
-            <a:lvl3pPr marL="1257300" indent="-361950" algn="l" defTabSz="914400" rtl="0" eaLnBrk="1" latinLnBrk="0" hangingPunct="1">
-              <a:lnSpc>
-                <a:spcPct val="90000"/>
-              </a:lnSpc>
-              <a:spcBef>
-                <a:spcPts val="600"/>
-              </a:spcBef>
-              <a:buSzPct val="88000"/>
-              <a:buFontTx/>
-              <a:buBlip>
-                <a:blip r:embed="rId2"/>
-              </a:buBlip>
-              <a:defRPr sz="2000" kern="1200">
-                <a:solidFill>
-                  <a:schemeClr val="tx1"/>
-                </a:solidFill>
-                <a:latin typeface="+mn-lt"/>
-                <a:ea typeface="+mn-ea"/>
-                <a:cs typeface="+mn-cs"/>
-              </a:defRPr>
-            </a:lvl3pPr>
-            <a:lvl4pPr marL="1704975" indent="-361950" algn="l" defTabSz="914400" rtl="0" eaLnBrk="1" latinLnBrk="0" hangingPunct="1">
-              <a:lnSpc>
-                <a:spcPct val="90000"/>
-              </a:lnSpc>
-              <a:spcBef>
-                <a:spcPts val="600"/>
-              </a:spcBef>
-              <a:buSzPct val="88000"/>
-              <a:buFontTx/>
-              <a:buBlip>
-                <a:blip r:embed="rId2"/>
-              </a:buBlip>
-              <a:defRPr sz="2000" kern="1200">
-                <a:solidFill>
-                  <a:schemeClr val="tx1"/>
-                </a:solidFill>
-                <a:latin typeface="+mn-lt"/>
-                <a:ea typeface="+mn-ea"/>
-                <a:cs typeface="+mn-cs"/>
-              </a:defRPr>
-            </a:lvl4pPr>
-            <a:lvl5pPr marL="2152650" indent="-361950" algn="l" defTabSz="914400" rtl="0" eaLnBrk="1" latinLnBrk="0" hangingPunct="1">
-              <a:lnSpc>
-                <a:spcPct val="90000"/>
-              </a:lnSpc>
-              <a:spcBef>
-                <a:spcPts val="600"/>
-              </a:spcBef>
-              <a:buSzPct val="88000"/>
-              <a:buFontTx/>
-              <a:buBlip>
-                <a:blip r:embed="rId2"/>
-              </a:buBlip>
-              <a:defRPr sz="2000" kern="1200">
-                <a:solidFill>
-                  <a:schemeClr val="tx1"/>
-                </a:solidFill>
-                <a:latin typeface="+mn-lt"/>
-                <a:ea typeface="+mn-ea"/>
-                <a:cs typeface="+mn-cs"/>
-              </a:defRPr>
-            </a:lvl5pPr>
-            <a:lvl6pPr marL="2514600" indent="-228600" algn="l" defTabSz="914400" rtl="0" eaLnBrk="1" latinLnBrk="0" hangingPunct="1">
-              <a:lnSpc>
-                <a:spcPct val="90000"/>
-              </a:lnSpc>
-              <a:spcBef>
-                <a:spcPts val="500"/>
-              </a:spcBef>
-              <a:buFont typeface="Arial" panose="020B0604020202020204" pitchFamily="34" charset="0"/>
-              <a:buChar char="•"/>
-              <a:defRPr sz="1800" kern="1200">
-                <a:solidFill>
-                  <a:schemeClr val="tx1"/>
-                </a:solidFill>
-                <a:latin typeface="+mn-lt"/>
-                <a:ea typeface="+mn-ea"/>
-                <a:cs typeface="+mn-cs"/>
-              </a:defRPr>
-            </a:lvl6pPr>
-            <a:lvl7pPr marL="2971800" indent="-228600" algn="l" defTabSz="914400" rtl="0" eaLnBrk="1" latinLnBrk="0" hangingPunct="1">
-              <a:lnSpc>
-                <a:spcPct val="90000"/>
-              </a:lnSpc>
-              <a:spcBef>
-                <a:spcPts val="500"/>
-              </a:spcBef>
-              <a:buFont typeface="Arial" panose="020B0604020202020204" pitchFamily="34" charset="0"/>
-              <a:buChar char="•"/>
-              <a:defRPr sz="1800" kern="1200">
-                <a:solidFill>
-                  <a:schemeClr val="tx1"/>
-                </a:solidFill>
-                <a:latin typeface="+mn-lt"/>
-                <a:ea typeface="+mn-ea"/>
-                <a:cs typeface="+mn-cs"/>
-              </a:defRPr>
-            </a:lvl7pPr>
-            <a:lvl8pPr marL="3429000" indent="-228600" algn="l" defTabSz="914400" rtl="0" eaLnBrk="1" latinLnBrk="0" hangingPunct="1">
-              <a:lnSpc>
-                <a:spcPct val="90000"/>
-              </a:lnSpc>
-              <a:spcBef>
-                <a:spcPts val="500"/>
-              </a:spcBef>
-              <a:buFont typeface="Arial" panose="020B0604020202020204" pitchFamily="34" charset="0"/>
-              <a:buChar char="•"/>
-              <a:defRPr sz="1800" kern="1200">
-                <a:solidFill>
-                  <a:schemeClr val="tx1"/>
-                </a:solidFill>
-                <a:latin typeface="+mn-lt"/>
-                <a:ea typeface="+mn-ea"/>
-                <a:cs typeface="+mn-cs"/>
-              </a:defRPr>
-            </a:lvl8pPr>
-            <a:lvl9pPr marL="3886200" indent="-228600" algn="l" defTabSz="914400" rtl="0" eaLnBrk="1" latinLnBrk="0" hangingPunct="1">
-              <a:lnSpc>
-                <a:spcPct val="90000"/>
-              </a:lnSpc>
-              <a:spcBef>
-                <a:spcPts val="500"/>
-              </a:spcBef>
-              <a:buFont typeface="Arial" panose="020B0604020202020204" pitchFamily="34" charset="0"/>
-              <a:buChar char="•"/>
-              <a:defRPr sz="1800" kern="1200">
-                <a:solidFill>
-                  <a:schemeClr val="tx1"/>
-                </a:solidFill>
-                <a:latin typeface="+mn-lt"/>
-                <a:ea typeface="+mn-ea"/>
-                <a:cs typeface="+mn-cs"/>
-              </a:defRPr>
-            </a:lvl9pPr>
-          </a:lstStyle>
-          <a:p>
-            <a:pPr>
-              <a:lnSpc>
-                <a:spcPct val="100000"/>
-              </a:lnSpc>
-            </a:pPr>
-            <a:r>
-              <a:rPr lang="de-DE" dirty="0"/>
-              <a:t>A.1 , A.2 , B ist erlaubt</a:t>
-            </a:r>
-          </a:p>
-          <a:p>
-            <a:pPr lvl="1">
-              <a:lnSpc>
-                <a:spcPct val="100000"/>
-              </a:lnSpc>
-            </a:pPr>
-            <a:r>
-              <a:rPr lang="de-DE" dirty="0"/>
-              <a:t>A.1, B nicht</a:t>
-            </a:r>
-          </a:p>
-          <a:p>
-            <a:pPr lvl="1">
-              <a:lnSpc>
-                <a:spcPct val="100000"/>
-              </a:lnSpc>
-            </a:pPr>
-            <a:r>
-              <a:rPr lang="de-DE" dirty="0"/>
-              <a:t>A.1, A.2, B.1 auch nicht</a:t>
-            </a:r>
-          </a:p>
-          <a:p>
-            <a:pPr>
-              <a:lnSpc>
-                <a:spcPct val="100000"/>
-              </a:lnSpc>
-            </a:pPr>
-            <a:r>
-              <a:rPr lang="de-DE" dirty="0"/>
-              <a:t>Knoten ist Multi-Menge</a:t>
-            </a:r>
-          </a:p>
-          <a:p>
-            <a:pPr lvl="1">
-              <a:lnSpc>
-                <a:spcPct val="100000"/>
-              </a:lnSpc>
-            </a:pPr>
-            <a:endParaRPr lang="de-DE" dirty="0"/>
-          </a:p>
-        </p:txBody>
-      </p:sp>
+        </p:grpSpPr>
+        <p:grpSp>
+          <p:nvGrpSpPr>
+            <p:cNvPr id="5" name="Gruppieren 4">
+              <a:extLst>
+                <a:ext uri="{FF2B5EF4-FFF2-40B4-BE49-F238E27FC236}">
+                  <a16:creationId xmlns:a16="http://schemas.microsoft.com/office/drawing/2014/main" id="{CBC3684D-6260-7F46-AC33-9D66FFA62BAA}"/>
+                </a:ext>
+              </a:extLst>
+            </p:cNvPr>
+            <p:cNvGrpSpPr/>
+            <p:nvPr/>
+          </p:nvGrpSpPr>
+          <p:grpSpPr>
+            <a:xfrm>
+              <a:off x="6034377" y="3220347"/>
+              <a:ext cx="2683425" cy="2963365"/>
+              <a:chOff x="6034377" y="3220347"/>
+              <a:chExt cx="2683425" cy="2963365"/>
+            </a:xfrm>
+          </p:grpSpPr>
+          <p:pic>
+            <p:nvPicPr>
+              <p:cNvPr id="11" name="Grafik 10">
+                <a:extLst>
+                  <a:ext uri="{FF2B5EF4-FFF2-40B4-BE49-F238E27FC236}">
+                    <a16:creationId xmlns:a16="http://schemas.microsoft.com/office/drawing/2014/main" id="{0A2DD6A0-97A6-D94B-AFA3-1E359CCC5AB9}"/>
+                  </a:ext>
+                </a:extLst>
+              </p:cNvPr>
+              <p:cNvPicPr>
+                <a:picLocks noChangeAspect="1"/>
+              </p:cNvPicPr>
+              <p:nvPr/>
+            </p:nvPicPr>
+            <p:blipFill>
+              <a:blip r:embed="rId2">
+                <a:extLst>
+                  <a:ext uri="{28A0092B-C50C-407E-A947-70E740481C1C}">
+                    <a14:useLocalDpi xmlns:a14="http://schemas.microsoft.com/office/drawing/2010/main" val="0"/>
+                  </a:ext>
+                  <a:ext uri="{96DAC541-7B7A-43D3-8B79-37D633B846F1}">
+                    <asvg:svgBlip xmlns:asvg="http://schemas.microsoft.com/office/drawing/2016/SVG/main" r:embed="rId3"/>
+                  </a:ext>
+                </a:extLst>
+              </a:blip>
+              <a:stretch>
+                <a:fillRect/>
+              </a:stretch>
+            </p:blipFill>
+            <p:spPr>
+              <a:xfrm>
+                <a:off x="7528947" y="4993874"/>
+                <a:ext cx="1188855" cy="1189838"/>
+              </a:xfrm>
+              <a:prstGeom prst="rect">
+                <a:avLst/>
+              </a:prstGeom>
+            </p:spPr>
+          </p:pic>
+          <p:pic>
+            <p:nvPicPr>
+              <p:cNvPr id="12" name="Grafik 11">
+                <a:extLst>
+                  <a:ext uri="{FF2B5EF4-FFF2-40B4-BE49-F238E27FC236}">
+                    <a16:creationId xmlns:a16="http://schemas.microsoft.com/office/drawing/2014/main" id="{51B681CA-8740-1646-ACA6-B1572AAC2A55}"/>
+                  </a:ext>
+                </a:extLst>
+              </p:cNvPr>
+              <p:cNvPicPr>
+                <a:picLocks noChangeAspect="1"/>
+              </p:cNvPicPr>
+              <p:nvPr/>
+            </p:nvPicPr>
+            <p:blipFill>
+              <a:blip r:embed="rId4">
+                <a:extLst>
+                  <a:ext uri="{28A0092B-C50C-407E-A947-70E740481C1C}">
+                    <a14:useLocalDpi xmlns:a14="http://schemas.microsoft.com/office/drawing/2010/main" val="0"/>
+                  </a:ext>
+                  <a:ext uri="{96DAC541-7B7A-43D3-8B79-37D633B846F1}">
+                    <asvg:svgBlip xmlns:asvg="http://schemas.microsoft.com/office/drawing/2016/SVG/main" r:embed="rId5"/>
+                  </a:ext>
+                </a:extLst>
+              </a:blip>
+              <a:stretch>
+                <a:fillRect/>
+              </a:stretch>
+            </p:blipFill>
+            <p:spPr>
+              <a:xfrm>
+                <a:off x="7528947" y="3220347"/>
+                <a:ext cx="1188855" cy="1189838"/>
+              </a:xfrm>
+              <a:prstGeom prst="rect">
+                <a:avLst/>
+              </a:prstGeom>
+            </p:spPr>
+          </p:pic>
+          <p:pic>
+            <p:nvPicPr>
+              <p:cNvPr id="13" name="Grafik 12">
+                <a:extLst>
+                  <a:ext uri="{FF2B5EF4-FFF2-40B4-BE49-F238E27FC236}">
+                    <a16:creationId xmlns:a16="http://schemas.microsoft.com/office/drawing/2014/main" id="{37A6CE56-9020-BE44-9949-27A74B543A74}"/>
+                  </a:ext>
+                </a:extLst>
+              </p:cNvPr>
+              <p:cNvPicPr>
+                <a:picLocks noChangeAspect="1"/>
+              </p:cNvPicPr>
+              <p:nvPr/>
+            </p:nvPicPr>
+            <p:blipFill>
+              <a:blip r:embed="rId6">
+                <a:extLst>
+                  <a:ext uri="{28A0092B-C50C-407E-A947-70E740481C1C}">
+                    <a14:useLocalDpi xmlns:a14="http://schemas.microsoft.com/office/drawing/2010/main" val="0"/>
+                  </a:ext>
+                  <a:ext uri="{96DAC541-7B7A-43D3-8B79-37D633B846F1}">
+                    <asvg:svgBlip xmlns:asvg="http://schemas.microsoft.com/office/drawing/2016/SVG/main" r:embed="rId7"/>
+                  </a:ext>
+                </a:extLst>
+              </a:blip>
+              <a:stretch>
+                <a:fillRect/>
+              </a:stretch>
+            </p:blipFill>
+            <p:spPr>
+              <a:xfrm>
+                <a:off x="6034377" y="4151476"/>
+                <a:ext cx="1188855" cy="1189838"/>
+              </a:xfrm>
+              <a:prstGeom prst="rect">
+                <a:avLst/>
+              </a:prstGeom>
+            </p:spPr>
+          </p:pic>
+        </p:grpSp>
+        <p:sp>
+          <p:nvSpPr>
+            <p:cNvPr id="9" name="Textfeld 8">
+              <a:extLst>
+                <a:ext uri="{FF2B5EF4-FFF2-40B4-BE49-F238E27FC236}">
+                  <a16:creationId xmlns:a16="http://schemas.microsoft.com/office/drawing/2014/main" id="{8975F2DE-3369-6145-AE3F-A3D0FF536E51}"/>
+                </a:ext>
+              </a:extLst>
+            </p:cNvPr>
+            <p:cNvSpPr txBox="1"/>
+            <p:nvPr/>
+          </p:nvSpPr>
+          <p:spPr>
+            <a:xfrm>
+              <a:off x="3706431" y="4527595"/>
+              <a:ext cx="1127232" cy="461665"/>
+            </a:xfrm>
+            <a:prstGeom prst="rect">
+              <a:avLst/>
+            </a:prstGeom>
+            <a:noFill/>
+          </p:spPr>
+          <p:txBody>
+            <a:bodyPr wrap="none" rtlCol="0">
+              <a:spAutoFit/>
+            </a:bodyPr>
+            <a:lstStyle/>
+            <a:p>
+              <a:r>
+                <a:rPr lang="en-US" sz="2400" dirty="0"/>
+                <a:t>“Node”</a:t>
+              </a:r>
+            </a:p>
+          </p:txBody>
+        </p:sp>
+        <p:sp>
+          <p:nvSpPr>
+            <p:cNvPr id="14" name="Pfeil nach rechts 13">
+              <a:extLst>
+                <a:ext uri="{FF2B5EF4-FFF2-40B4-BE49-F238E27FC236}">
+                  <a16:creationId xmlns:a16="http://schemas.microsoft.com/office/drawing/2014/main" id="{24C8E1BF-BC31-1747-A4DE-C1689FEA9C36}"/>
+                </a:ext>
+              </a:extLst>
+            </p:cNvPr>
+            <p:cNvSpPr/>
+            <p:nvPr/>
+          </p:nvSpPr>
+          <p:spPr>
+            <a:xfrm>
+              <a:off x="4938936" y="4549748"/>
+              <a:ext cx="821256" cy="417360"/>
+            </a:xfrm>
+            <a:prstGeom prst="rightArrow">
+              <a:avLst/>
+            </a:prstGeom>
+          </p:spPr>
+          <p:style>
+            <a:lnRef idx="2">
+              <a:schemeClr val="accent1">
+                <a:shade val="50000"/>
+              </a:schemeClr>
+            </a:lnRef>
+            <a:fillRef idx="1">
+              <a:schemeClr val="accent1"/>
+            </a:fillRef>
+            <a:effectRef idx="0">
+              <a:schemeClr val="accent1"/>
+            </a:effectRef>
+            <a:fontRef idx="minor">
+              <a:schemeClr val="lt1"/>
+            </a:fontRef>
+          </p:style>
+          <p:txBody>
+            <a:bodyPr rtlCol="0" anchor="ctr"/>
+            <a:lstStyle/>
+            <a:p>
+              <a:pPr algn="ctr"/>
+              <a:endParaRPr lang="en-US"/>
+            </a:p>
+          </p:txBody>
+        </p:sp>
+      </p:grpSp>
     </p:spTree>
     <p:extLst>
       <p:ext uri="{BB962C8B-B14F-4D97-AF65-F5344CB8AC3E}">
-        <p14:creationId xmlns:p14="http://schemas.microsoft.com/office/powerpoint/2010/main" val="3528647106"/>
+        <p14:creationId xmlns:p14="http://schemas.microsoft.com/office/powerpoint/2010/main" val="302426992"/>
       </p:ext>
     </p:extLst>
   </p:cSld>

</xml_diff>